<commit_message>
Moved updated files from origin
</commit_message>
<xml_diff>
--- a/Presentation/Advanced Regression Techniques To Predict Housing Prices.pptx
+++ b/Presentation/Advanced Regression Techniques To Predict Housing Prices.pptx
@@ -7,16 +7,17 @@
   <p:sldIdLst>
     <p:sldId id="256" r:id="rId2"/>
     <p:sldId id="259" r:id="rId3"/>
-    <p:sldId id="261" r:id="rId4"/>
-    <p:sldId id="257" r:id="rId5"/>
-    <p:sldId id="260" r:id="rId6"/>
-    <p:sldId id="262" r:id="rId7"/>
-    <p:sldId id="258" r:id="rId8"/>
-    <p:sldId id="263" r:id="rId9"/>
-    <p:sldId id="264" r:id="rId10"/>
-    <p:sldId id="265" r:id="rId11"/>
-    <p:sldId id="266" r:id="rId12"/>
-    <p:sldId id="267" r:id="rId13"/>
+    <p:sldId id="262" r:id="rId4"/>
+    <p:sldId id="260" r:id="rId5"/>
+    <p:sldId id="271" r:id="rId6"/>
+    <p:sldId id="264" r:id="rId7"/>
+    <p:sldId id="263" r:id="rId8"/>
+    <p:sldId id="272" r:id="rId9"/>
+    <p:sldId id="273" r:id="rId10"/>
+    <p:sldId id="269" r:id="rId11"/>
+    <p:sldId id="270" r:id="rId12"/>
+    <p:sldId id="268" r:id="rId13"/>
+    <p:sldId id="258" r:id="rId14"/>
   </p:sldIdLst>
   <p:sldSz cx="12192000" cy="6858000"/>
   <p:notesSz cx="6858000" cy="9144000"/>
@@ -115,6 +116,11 @@
       </a:defRPr>
     </a:lvl9pPr>
   </p:defaultTextStyle>
+  <p:extLst>
+    <p:ext uri="{EFAFB233-063F-42B5-8137-9DF3F51BA10A}">
+      <p15:sldGuideLst xmlns:p15="http://schemas.microsoft.com/office/powerpoint/2012/main"/>
+    </p:ext>
+  </p:extLst>
 </p:presentation>
 </file>
 
@@ -128,6 +134,422 @@
     </p:extLst>
   </p:cmAuthor>
 </p:cmAuthorLst>
+</file>
+
+<file path=ppt/revisionInfo.xml><?xml version="1.0" encoding="utf-8"?>
+<p1510:revInfo xmlns:a="http://schemas.openxmlformats.org/drawingml/2006/main" xmlns:r="http://schemas.openxmlformats.org/officeDocument/2006/relationships" xmlns:p1510="http://schemas.microsoft.com/office/powerpoint/2015/10/main">
+  <p1510:revLst>
+    <p1510:client id="{472C5C26-5EC0-42B6-B6B3-2645E9773377}" v="38" dt="2020-07-23T23:40:44.194"/>
+  </p1510:revLst>
+</p1510:revInfo>
+</file>
+
+<file path=ppt/changesInfos/changesInfo1.xml><?xml version="1.0" encoding="utf-8"?>
+<pc:chgInfo xmlns:a="http://schemas.openxmlformats.org/drawingml/2006/main" xmlns:r="http://schemas.openxmlformats.org/officeDocument/2006/relationships" xmlns:ac="http://schemas.microsoft.com/office/drawing/2013/main/command" xmlns:pc="http://schemas.microsoft.com/office/powerpoint/2013/main/command">
+  <pc:docChgLst>
+    <pc:chgData name="Peter Shapiro" userId="9869b8b9caf854e2" providerId="LiveId" clId="{472C5C26-5EC0-42B6-B6B3-2645E9773377}"/>
+    <pc:docChg chg="undo custSel mod addSld delSld modSld sldOrd">
+      <pc:chgData name="Peter Shapiro" userId="9869b8b9caf854e2" providerId="LiveId" clId="{472C5C26-5EC0-42B6-B6B3-2645E9773377}" dt="2020-07-25T13:30:47.350" v="2389" actId="20577"/>
+      <pc:docMkLst>
+        <pc:docMk/>
+      </pc:docMkLst>
+      <pc:sldChg chg="modSp del mod">
+        <pc:chgData name="Peter Shapiro" userId="9869b8b9caf854e2" providerId="LiveId" clId="{472C5C26-5EC0-42B6-B6B3-2645E9773377}" dt="2020-07-24T02:01:56.762" v="1269" actId="47"/>
+        <pc:sldMkLst>
+          <pc:docMk/>
+          <pc:sldMk cId="3754238954" sldId="257"/>
+        </pc:sldMkLst>
+        <pc:spChg chg="mod">
+          <ac:chgData name="Peter Shapiro" userId="9869b8b9caf854e2" providerId="LiveId" clId="{472C5C26-5EC0-42B6-B6B3-2645E9773377}" dt="2020-07-23T23:59:31.947" v="575" actId="5793"/>
+          <ac:spMkLst>
+            <pc:docMk/>
+            <pc:sldMk cId="3754238954" sldId="257"/>
+            <ac:spMk id="6" creationId="{26F718AD-E933-43C0-BD2B-135BF343B637}"/>
+          </ac:spMkLst>
+        </pc:spChg>
+      </pc:sldChg>
+      <pc:sldChg chg="addSp delSp modSp mod ord">
+        <pc:chgData name="Peter Shapiro" userId="9869b8b9caf854e2" providerId="LiveId" clId="{472C5C26-5EC0-42B6-B6B3-2645E9773377}" dt="2020-07-24T02:02:56.004" v="1273"/>
+        <pc:sldMkLst>
+          <pc:docMk/>
+          <pc:sldMk cId="2268026075" sldId="258"/>
+        </pc:sldMkLst>
+        <pc:spChg chg="mod">
+          <ac:chgData name="Peter Shapiro" userId="9869b8b9caf854e2" providerId="LiveId" clId="{472C5C26-5EC0-42B6-B6B3-2645E9773377}" dt="2020-07-24T01:04:23.718" v="680" actId="1076"/>
+          <ac:spMkLst>
+            <pc:docMk/>
+            <pc:sldMk cId="2268026075" sldId="258"/>
+            <ac:spMk id="9" creationId="{CCCFA817-377B-456A-8190-6C7AEDBC176E}"/>
+          </ac:spMkLst>
+        </pc:spChg>
+        <pc:spChg chg="add mod">
+          <ac:chgData name="Peter Shapiro" userId="9869b8b9caf854e2" providerId="LiveId" clId="{472C5C26-5EC0-42B6-B6B3-2645E9773377}" dt="2020-07-24T01:03:07.052" v="675" actId="1076"/>
+          <ac:spMkLst>
+            <pc:docMk/>
+            <pc:sldMk cId="2268026075" sldId="258"/>
+            <ac:spMk id="14" creationId="{818C94FA-E776-423A-86FE-714E34EAD2D1}"/>
+          </ac:spMkLst>
+        </pc:spChg>
+        <pc:spChg chg="add mod">
+          <ac:chgData name="Peter Shapiro" userId="9869b8b9caf854e2" providerId="LiveId" clId="{472C5C26-5EC0-42B6-B6B3-2645E9773377}" dt="2020-07-24T01:02:16.269" v="615" actId="1076"/>
+          <ac:spMkLst>
+            <pc:docMk/>
+            <pc:sldMk cId="2268026075" sldId="258"/>
+            <ac:spMk id="17" creationId="{D360231A-B509-4BD1-B997-EB37C3E384E7}"/>
+          </ac:spMkLst>
+        </pc:spChg>
+        <pc:spChg chg="add mod">
+          <ac:chgData name="Peter Shapiro" userId="9869b8b9caf854e2" providerId="LiveId" clId="{472C5C26-5EC0-42B6-B6B3-2645E9773377}" dt="2020-07-24T01:47:05.695" v="734" actId="1076"/>
+          <ac:spMkLst>
+            <pc:docMk/>
+            <pc:sldMk cId="2268026075" sldId="258"/>
+            <ac:spMk id="19" creationId="{6E84212A-2B63-46A5-BC3F-D2F2483A5566}"/>
+          </ac:spMkLst>
+        </pc:spChg>
+        <pc:spChg chg="add mod">
+          <ac:chgData name="Peter Shapiro" userId="9869b8b9caf854e2" providerId="LiveId" clId="{472C5C26-5EC0-42B6-B6B3-2645E9773377}" dt="2020-07-24T01:47:02.466" v="733" actId="1076"/>
+          <ac:spMkLst>
+            <pc:docMk/>
+            <pc:sldMk cId="2268026075" sldId="258"/>
+            <ac:spMk id="20" creationId="{83492A7F-A842-460E-A501-54892C7B98F1}"/>
+          </ac:spMkLst>
+        </pc:spChg>
+        <pc:spChg chg="add mod">
+          <ac:chgData name="Peter Shapiro" userId="9869b8b9caf854e2" providerId="LiveId" clId="{472C5C26-5EC0-42B6-B6B3-2645E9773377}" dt="2020-07-24T01:47:11.243" v="735" actId="1076"/>
+          <ac:spMkLst>
+            <pc:docMk/>
+            <pc:sldMk cId="2268026075" sldId="258"/>
+            <ac:spMk id="21" creationId="{579087E1-CBD1-4BCA-8DD5-B7E9DBBC51FD}"/>
+          </ac:spMkLst>
+        </pc:spChg>
+        <pc:picChg chg="add del mod">
+          <ac:chgData name="Peter Shapiro" userId="9869b8b9caf854e2" providerId="LiveId" clId="{472C5C26-5EC0-42B6-B6B3-2645E9773377}" dt="2020-07-24T00:55:32.264" v="594" actId="478"/>
+          <ac:picMkLst>
+            <pc:docMk/>
+            <pc:sldMk cId="2268026075" sldId="258"/>
+            <ac:picMk id="5" creationId="{4E4744E7-5094-43E7-AA6B-B7AA40E84814}"/>
+          </ac:picMkLst>
+        </pc:picChg>
+        <pc:picChg chg="del mod">
+          <ac:chgData name="Peter Shapiro" userId="9869b8b9caf854e2" providerId="LiveId" clId="{472C5C26-5EC0-42B6-B6B3-2645E9773377}" dt="2020-07-24T00:52:48.336" v="578" actId="478"/>
+          <ac:picMkLst>
+            <pc:docMk/>
+            <pc:sldMk cId="2268026075" sldId="258"/>
+            <ac:picMk id="6" creationId="{D3A96ACD-8D92-4E25-95C6-61144FF49DC3}"/>
+          </ac:picMkLst>
+        </pc:picChg>
+        <pc:picChg chg="mod">
+          <ac:chgData name="Peter Shapiro" userId="9869b8b9caf854e2" providerId="LiveId" clId="{472C5C26-5EC0-42B6-B6B3-2645E9773377}" dt="2020-07-24T01:04:19.300" v="679" actId="1076"/>
+          <ac:picMkLst>
+            <pc:docMk/>
+            <pc:sldMk cId="2268026075" sldId="258"/>
+            <ac:picMk id="8" creationId="{3C35FEE8-163F-493D-8671-9AB360ED2544}"/>
+          </ac:picMkLst>
+        </pc:picChg>
+        <pc:picChg chg="add del mod">
+          <ac:chgData name="Peter Shapiro" userId="9869b8b9caf854e2" providerId="LiveId" clId="{472C5C26-5EC0-42B6-B6B3-2645E9773377}" dt="2020-07-24T00:55:34.805" v="595" actId="478"/>
+          <ac:picMkLst>
+            <pc:docMk/>
+            <pc:sldMk cId="2268026075" sldId="258"/>
+            <ac:picMk id="10" creationId="{6C8949E3-3427-416C-8D31-11460A269915}"/>
+          </ac:picMkLst>
+        </pc:picChg>
+        <pc:picChg chg="add mod">
+          <ac:chgData name="Peter Shapiro" userId="9869b8b9caf854e2" providerId="LiveId" clId="{472C5C26-5EC0-42B6-B6B3-2645E9773377}" dt="2020-07-24T00:56:17.145" v="598" actId="14100"/>
+          <ac:picMkLst>
+            <pc:docMk/>
+            <pc:sldMk cId="2268026075" sldId="258"/>
+            <ac:picMk id="12" creationId="{5499E8A9-AC42-4E97-A548-00A6BAC47D0F}"/>
+          </ac:picMkLst>
+        </pc:picChg>
+        <pc:picChg chg="add mod">
+          <ac:chgData name="Peter Shapiro" userId="9869b8b9caf854e2" providerId="LiveId" clId="{472C5C26-5EC0-42B6-B6B3-2645E9773377}" dt="2020-07-24T01:04:02.733" v="676" actId="1076"/>
+          <ac:picMkLst>
+            <pc:docMk/>
+            <pc:sldMk cId="2268026075" sldId="258"/>
+            <ac:picMk id="16" creationId="{1455A19A-CC32-4ABF-ADEF-ACEBCC3BC92E}"/>
+          </ac:picMkLst>
+        </pc:picChg>
+      </pc:sldChg>
+      <pc:sldChg chg="addSp modSp mod">
+        <pc:chgData name="Peter Shapiro" userId="9869b8b9caf854e2" providerId="LiveId" clId="{472C5C26-5EC0-42B6-B6B3-2645E9773377}" dt="2020-07-24T02:01:40.061" v="1268" actId="404"/>
+        <pc:sldMkLst>
+          <pc:docMk/>
+          <pc:sldMk cId="1831259123" sldId="259"/>
+        </pc:sldMkLst>
+        <pc:spChg chg="add mod">
+          <ac:chgData name="Peter Shapiro" userId="9869b8b9caf854e2" providerId="LiveId" clId="{472C5C26-5EC0-42B6-B6B3-2645E9773377}" dt="2020-07-24T02:01:40.061" v="1268" actId="404"/>
+          <ac:spMkLst>
+            <pc:docMk/>
+            <pc:sldMk cId="1831259123" sldId="259"/>
+            <ac:spMk id="3" creationId="{9FC14FFD-19C6-4A78-AA99-5A9669BCE9D4}"/>
+          </ac:spMkLst>
+        </pc:spChg>
+        <pc:graphicFrameChg chg="mod">
+          <ac:chgData name="Peter Shapiro" userId="9869b8b9caf854e2" providerId="LiveId" clId="{472C5C26-5EC0-42B6-B6B3-2645E9773377}" dt="2020-07-24T02:01:30.617" v="1267"/>
+          <ac:graphicFrameMkLst>
+            <pc:docMk/>
+            <pc:sldMk cId="1831259123" sldId="259"/>
+            <ac:graphicFrameMk id="11" creationId="{F852BE8B-9635-4E51-A6B9-9C8D7D454EF1}"/>
+          </ac:graphicFrameMkLst>
+        </pc:graphicFrameChg>
+      </pc:sldChg>
+      <pc:sldChg chg="modSp ord">
+        <pc:chgData name="Peter Shapiro" userId="9869b8b9caf854e2" providerId="LiveId" clId="{472C5C26-5EC0-42B6-B6B3-2645E9773377}" dt="2020-07-25T13:30:47.350" v="2389" actId="20577"/>
+        <pc:sldMkLst>
+          <pc:docMk/>
+          <pc:sldMk cId="3736996976" sldId="260"/>
+        </pc:sldMkLst>
+        <pc:graphicFrameChg chg="mod">
+          <ac:chgData name="Peter Shapiro" userId="9869b8b9caf854e2" providerId="LiveId" clId="{472C5C26-5EC0-42B6-B6B3-2645E9773377}" dt="2020-07-25T13:30:47.350" v="2389" actId="20577"/>
+          <ac:graphicFrameMkLst>
+            <pc:docMk/>
+            <pc:sldMk cId="3736996976" sldId="260"/>
+            <ac:graphicFrameMk id="5" creationId="{FAE99089-0C7C-4952-B873-563D811DC50F}"/>
+          </ac:graphicFrameMkLst>
+        </pc:graphicFrameChg>
+      </pc:sldChg>
+      <pc:sldChg chg="addSp delSp modSp del mod">
+        <pc:chgData name="Peter Shapiro" userId="9869b8b9caf854e2" providerId="LiveId" clId="{472C5C26-5EC0-42B6-B6B3-2645E9773377}" dt="2020-07-24T01:56:40.487" v="847" actId="47"/>
+        <pc:sldMkLst>
+          <pc:docMk/>
+          <pc:sldMk cId="2131613205" sldId="261"/>
+        </pc:sldMkLst>
+        <pc:spChg chg="mod">
+          <ac:chgData name="Peter Shapiro" userId="9869b8b9caf854e2" providerId="LiveId" clId="{472C5C26-5EC0-42B6-B6B3-2645E9773377}" dt="2020-07-23T23:51:28.901" v="107" actId="26606"/>
+          <ac:spMkLst>
+            <pc:docMk/>
+            <pc:sldMk cId="2131613205" sldId="261"/>
+            <ac:spMk id="2" creationId="{5DDF07D5-A6A7-4D59-B181-D9EF8A1B6421}"/>
+          </ac:spMkLst>
+        </pc:spChg>
+        <pc:spChg chg="mod">
+          <ac:chgData name="Peter Shapiro" userId="9869b8b9caf854e2" providerId="LiveId" clId="{472C5C26-5EC0-42B6-B6B3-2645E9773377}" dt="2020-07-24T01:49:21.957" v="736" actId="21"/>
+          <ac:spMkLst>
+            <pc:docMk/>
+            <pc:sldMk cId="2131613205" sldId="261"/>
+            <ac:spMk id="6" creationId="{26F718AD-E933-43C0-BD2B-135BF343B637}"/>
+          </ac:spMkLst>
+        </pc:spChg>
+        <pc:spChg chg="add del">
+          <ac:chgData name="Peter Shapiro" userId="9869b8b9caf854e2" providerId="LiveId" clId="{472C5C26-5EC0-42B6-B6B3-2645E9773377}" dt="2020-07-23T23:51:28.901" v="107" actId="26606"/>
+          <ac:spMkLst>
+            <pc:docMk/>
+            <pc:sldMk cId="2131613205" sldId="261"/>
+            <ac:spMk id="10" creationId="{07E773EB-1EC1-4E49-9DE2-E6F460497242}"/>
+          </ac:spMkLst>
+        </pc:spChg>
+        <pc:spChg chg="add del">
+          <ac:chgData name="Peter Shapiro" userId="9869b8b9caf854e2" providerId="LiveId" clId="{472C5C26-5EC0-42B6-B6B3-2645E9773377}" dt="2020-07-23T23:51:28.901" v="107" actId="26606"/>
+          <ac:spMkLst>
+            <pc:docMk/>
+            <pc:sldMk cId="2131613205" sldId="261"/>
+            <ac:spMk id="17" creationId="{59A309A7-1751-4ABE-A3C1-EEC40366AD89}"/>
+          </ac:spMkLst>
+        </pc:spChg>
+        <pc:spChg chg="add del">
+          <ac:chgData name="Peter Shapiro" userId="9869b8b9caf854e2" providerId="LiveId" clId="{472C5C26-5EC0-42B6-B6B3-2645E9773377}" dt="2020-07-23T23:51:28.901" v="107" actId="26606"/>
+          <ac:spMkLst>
+            <pc:docMk/>
+            <pc:sldMk cId="2131613205" sldId="261"/>
+            <ac:spMk id="19" creationId="{967D8EB6-EAE1-4F9C-B398-83321E287204}"/>
+          </ac:spMkLst>
+        </pc:spChg>
+        <pc:picChg chg="add del mod">
+          <ac:chgData name="Peter Shapiro" userId="9869b8b9caf854e2" providerId="LiveId" clId="{472C5C26-5EC0-42B6-B6B3-2645E9773377}" dt="2020-07-23T23:52:12.634" v="112" actId="478"/>
+          <ac:picMkLst>
+            <pc:docMk/>
+            <pc:sldMk cId="2131613205" sldId="261"/>
+            <ac:picMk id="4" creationId="{15613455-1A6E-4831-9C4C-2CC4626C9E0F}"/>
+          </ac:picMkLst>
+        </pc:picChg>
+        <pc:picChg chg="add del">
+          <ac:chgData name="Peter Shapiro" userId="9869b8b9caf854e2" providerId="LiveId" clId="{472C5C26-5EC0-42B6-B6B3-2645E9773377}" dt="2020-07-23T23:51:28.901" v="107" actId="26606"/>
+          <ac:picMkLst>
+            <pc:docMk/>
+            <pc:sldMk cId="2131613205" sldId="261"/>
+            <ac:picMk id="14" creationId="{F6157A80-630A-40B6-AE8B-9D252B9F4DC6}"/>
+          </ac:picMkLst>
+        </pc:picChg>
+      </pc:sldChg>
+      <pc:sldChg chg="modSp mod">
+        <pc:chgData name="Peter Shapiro" userId="9869b8b9caf854e2" providerId="LiveId" clId="{472C5C26-5EC0-42B6-B6B3-2645E9773377}" dt="2020-07-25T00:16:20.769" v="1306" actId="20577"/>
+        <pc:sldMkLst>
+          <pc:docMk/>
+          <pc:sldMk cId="1721869438" sldId="262"/>
+        </pc:sldMkLst>
+        <pc:spChg chg="mod">
+          <ac:chgData name="Peter Shapiro" userId="9869b8b9caf854e2" providerId="LiveId" clId="{472C5C26-5EC0-42B6-B6B3-2645E9773377}" dt="2020-07-25T00:16:20.769" v="1306" actId="20577"/>
+          <ac:spMkLst>
+            <pc:docMk/>
+            <pc:sldMk cId="1721869438" sldId="262"/>
+            <ac:spMk id="6" creationId="{26F718AD-E933-43C0-BD2B-135BF343B637}"/>
+          </ac:spMkLst>
+        </pc:spChg>
+      </pc:sldChg>
+      <pc:sldChg chg="addSp delSp modSp mod ord">
+        <pc:chgData name="Peter Shapiro" userId="9869b8b9caf854e2" providerId="LiveId" clId="{472C5C26-5EC0-42B6-B6B3-2645E9773377}" dt="2020-07-25T00:31:15.492" v="2179" actId="20577"/>
+        <pc:sldMkLst>
+          <pc:docMk/>
+          <pc:sldMk cId="828494711" sldId="263"/>
+        </pc:sldMkLst>
+        <pc:spChg chg="add mod">
+          <ac:chgData name="Peter Shapiro" userId="9869b8b9caf854e2" providerId="LiveId" clId="{472C5C26-5EC0-42B6-B6B3-2645E9773377}" dt="2020-07-25T00:31:15.492" v="2179" actId="20577"/>
+          <ac:spMkLst>
+            <pc:docMk/>
+            <pc:sldMk cId="828494711" sldId="263"/>
+            <ac:spMk id="8" creationId="{1CE18622-C91C-434C-8835-AD19B8CA3CF1}"/>
+          </ac:spMkLst>
+        </pc:spChg>
+        <pc:picChg chg="add">
+          <ac:chgData name="Peter Shapiro" userId="9869b8b9caf854e2" providerId="LiveId" clId="{472C5C26-5EC0-42B6-B6B3-2645E9773377}" dt="2020-07-25T00:22:54.127" v="1453" actId="22"/>
+          <ac:picMkLst>
+            <pc:docMk/>
+            <pc:sldMk cId="828494711" sldId="263"/>
+            <ac:picMk id="3" creationId="{DDF68E30-9C76-4DED-8F91-7CCFDD2BDCC1}"/>
+          </ac:picMkLst>
+        </pc:picChg>
+        <pc:picChg chg="del">
+          <ac:chgData name="Peter Shapiro" userId="9869b8b9caf854e2" providerId="LiveId" clId="{472C5C26-5EC0-42B6-B6B3-2645E9773377}" dt="2020-07-25T00:22:55.754" v="1454" actId="21"/>
+          <ac:picMkLst>
+            <pc:docMk/>
+            <pc:sldMk cId="828494711" sldId="263"/>
+            <ac:picMk id="5" creationId="{BD03B7CE-842C-4EA5-8C8E-C1919ABD4DB3}"/>
+          </ac:picMkLst>
+        </pc:picChg>
+      </pc:sldChg>
+      <pc:sldChg chg="addSp delSp modSp mod ord">
+        <pc:chgData name="Peter Shapiro" userId="9869b8b9caf854e2" providerId="LiveId" clId="{472C5C26-5EC0-42B6-B6B3-2645E9773377}" dt="2020-07-25T00:36:24.049" v="2319" actId="20577"/>
+        <pc:sldMkLst>
+          <pc:docMk/>
+          <pc:sldMk cId="1322738186" sldId="264"/>
+        </pc:sldMkLst>
+        <pc:spChg chg="mod">
+          <ac:chgData name="Peter Shapiro" userId="9869b8b9caf854e2" providerId="LiveId" clId="{472C5C26-5EC0-42B6-B6B3-2645E9773377}" dt="2020-07-25T00:33:58.102" v="2184" actId="20577"/>
+          <ac:spMkLst>
+            <pc:docMk/>
+            <pc:sldMk cId="1322738186" sldId="264"/>
+            <ac:spMk id="2" creationId="{F62E801A-2DC1-4FCF-8A19-E998D2D44A30}"/>
+          </ac:spMkLst>
+        </pc:spChg>
+        <pc:spChg chg="mod">
+          <ac:chgData name="Peter Shapiro" userId="9869b8b9caf854e2" providerId="LiveId" clId="{472C5C26-5EC0-42B6-B6B3-2645E9773377}" dt="2020-07-25T00:36:24.049" v="2319" actId="20577"/>
+          <ac:spMkLst>
+            <pc:docMk/>
+            <pc:sldMk cId="1322738186" sldId="264"/>
+            <ac:spMk id="8" creationId="{63BE62FE-4449-4620-8637-C3A25776BEB7}"/>
+          </ac:spMkLst>
+        </pc:spChg>
+        <pc:spChg chg="add mod">
+          <ac:chgData name="Peter Shapiro" userId="9869b8b9caf854e2" providerId="LiveId" clId="{472C5C26-5EC0-42B6-B6B3-2645E9773377}" dt="2020-07-25T00:36:02.997" v="2289" actId="1076"/>
+          <ac:spMkLst>
+            <pc:docMk/>
+            <pc:sldMk cId="1322738186" sldId="264"/>
+            <ac:spMk id="12" creationId="{945F3729-116A-4D02-965A-6C0C70E92E96}"/>
+          </ac:spMkLst>
+        </pc:spChg>
+        <pc:picChg chg="add del mod">
+          <ac:chgData name="Peter Shapiro" userId="9869b8b9caf854e2" providerId="LiveId" clId="{472C5C26-5EC0-42B6-B6B3-2645E9773377}" dt="2020-07-25T00:21:57.703" v="1357" actId="478"/>
+          <ac:picMkLst>
+            <pc:docMk/>
+            <pc:sldMk cId="1322738186" sldId="264"/>
+            <ac:picMk id="5" creationId="{D4691E13-633F-40C2-81EC-47B02BA2CA38}"/>
+          </ac:picMkLst>
+        </pc:picChg>
+        <pc:picChg chg="del mod">
+          <ac:chgData name="Peter Shapiro" userId="9869b8b9caf854e2" providerId="LiveId" clId="{472C5C26-5EC0-42B6-B6B3-2645E9773377}" dt="2020-07-25T00:18:10.762" v="1350" actId="478"/>
+          <ac:picMkLst>
+            <pc:docMk/>
+            <pc:sldMk cId="1322738186" sldId="264"/>
+            <ac:picMk id="6" creationId="{E140D26F-BDC3-4BEA-8AB9-B0258C7D359F}"/>
+          </ac:picMkLst>
+        </pc:picChg>
+        <pc:picChg chg="add del mod">
+          <ac:chgData name="Peter Shapiro" userId="9869b8b9caf854e2" providerId="LiveId" clId="{472C5C26-5EC0-42B6-B6B3-2645E9773377}" dt="2020-07-25T00:22:51.932" v="1452" actId="21"/>
+          <ac:picMkLst>
+            <pc:docMk/>
+            <pc:sldMk cId="1322738186" sldId="264"/>
+            <ac:picMk id="9" creationId="{5266BC5E-C8AE-48F9-8B40-C3488EF8EF98}"/>
+          </ac:picMkLst>
+        </pc:picChg>
+        <pc:picChg chg="del">
+          <ac:chgData name="Peter Shapiro" userId="9869b8b9caf854e2" providerId="LiveId" clId="{472C5C26-5EC0-42B6-B6B3-2645E9773377}" dt="2020-07-23T23:42:45.688" v="64" actId="478"/>
+          <ac:picMkLst>
+            <pc:docMk/>
+            <pc:sldMk cId="1322738186" sldId="264"/>
+            <ac:picMk id="10" creationId="{A554C847-A449-4647-8387-BA312FF6FAB4}"/>
+          </ac:picMkLst>
+        </pc:picChg>
+        <pc:picChg chg="add mod">
+          <ac:chgData name="Peter Shapiro" userId="9869b8b9caf854e2" providerId="LiveId" clId="{472C5C26-5EC0-42B6-B6B3-2645E9773377}" dt="2020-07-25T00:23:01.849" v="1456" actId="1076"/>
+          <ac:picMkLst>
+            <pc:docMk/>
+            <pc:sldMk cId="1322738186" sldId="264"/>
+            <ac:picMk id="11" creationId="{C823D7D2-C395-44CF-BDDE-C1653BA08169}"/>
+          </ac:picMkLst>
+        </pc:picChg>
+      </pc:sldChg>
+      <pc:sldChg chg="modSp del mod">
+        <pc:chgData name="Peter Shapiro" userId="9869b8b9caf854e2" providerId="LiveId" clId="{472C5C26-5EC0-42B6-B6B3-2645E9773377}" dt="2020-07-25T00:31:55.401" v="2180" actId="47"/>
+        <pc:sldMkLst>
+          <pc:docMk/>
+          <pc:sldMk cId="3652284154" sldId="265"/>
+        </pc:sldMkLst>
+        <pc:spChg chg="mod">
+          <ac:chgData name="Peter Shapiro" userId="9869b8b9caf854e2" providerId="LiveId" clId="{472C5C26-5EC0-42B6-B6B3-2645E9773377}" dt="2020-07-23T23:43:40.869" v="91"/>
+          <ac:spMkLst>
+            <pc:docMk/>
+            <pc:sldMk cId="3652284154" sldId="265"/>
+            <ac:spMk id="2" creationId="{F62E801A-2DC1-4FCF-8A19-E998D2D44A30}"/>
+          </ac:spMkLst>
+        </pc:spChg>
+      </pc:sldChg>
+      <pc:sldChg chg="del">
+        <pc:chgData name="Peter Shapiro" userId="9869b8b9caf854e2" providerId="LiveId" clId="{472C5C26-5EC0-42B6-B6B3-2645E9773377}" dt="2020-07-25T00:47:41.337" v="2328" actId="47"/>
+        <pc:sldMkLst>
+          <pc:docMk/>
+          <pc:sldMk cId="1149495627" sldId="267"/>
+        </pc:sldMkLst>
+      </pc:sldChg>
+      <pc:sldChg chg="modSp add mod">
+        <pc:chgData name="Peter Shapiro" userId="9869b8b9caf854e2" providerId="LiveId" clId="{472C5C26-5EC0-42B6-B6B3-2645E9773377}" dt="2020-07-24T02:03:03.163" v="1284" actId="20577"/>
+        <pc:sldMkLst>
+          <pc:docMk/>
+          <pc:sldMk cId="567204623" sldId="268"/>
+        </pc:sldMkLst>
+        <pc:spChg chg="mod">
+          <ac:chgData name="Peter Shapiro" userId="9869b8b9caf854e2" providerId="LiveId" clId="{472C5C26-5EC0-42B6-B6B3-2645E9773377}" dt="2020-07-24T02:03:03.163" v="1284" actId="20577"/>
+          <ac:spMkLst>
+            <pc:docMk/>
+            <pc:sldMk cId="567204623" sldId="268"/>
+            <ac:spMk id="2" creationId="{F62E801A-2DC1-4FCF-8A19-E998D2D44A30}"/>
+          </ac:spMkLst>
+        </pc:spChg>
+      </pc:sldChg>
+      <pc:sldChg chg="add">
+        <pc:chgData name="Peter Shapiro" userId="9869b8b9caf854e2" providerId="LiveId" clId="{472C5C26-5EC0-42B6-B6B3-2645E9773377}" dt="2020-07-25T00:47:38.937" v="2327" actId="22"/>
+        <pc:sldMkLst>
+          <pc:docMk/>
+          <pc:sldMk cId="36800252" sldId="269"/>
+        </pc:sldMkLst>
+      </pc:sldChg>
+      <pc:sldChg chg="add">
+        <pc:chgData name="Peter Shapiro" userId="9869b8b9caf854e2" providerId="LiveId" clId="{472C5C26-5EC0-42B6-B6B3-2645E9773377}" dt="2020-07-25T00:47:38.937" v="2327" actId="22"/>
+        <pc:sldMkLst>
+          <pc:docMk/>
+          <pc:sldMk cId="4130535459" sldId="270"/>
+        </pc:sldMkLst>
+      </pc:sldChg>
+      <pc:sldChg chg="add ord">
+        <pc:chgData name="Peter Shapiro" userId="9869b8b9caf854e2" providerId="LiveId" clId="{472C5C26-5EC0-42B6-B6B3-2645E9773377}" dt="2020-07-25T13:29:56.955" v="2332"/>
+        <pc:sldMkLst>
+          <pc:docMk/>
+          <pc:sldMk cId="1822752777" sldId="271"/>
+        </pc:sldMkLst>
+      </pc:sldChg>
+    </pc:docChg>
+  </pc:docChgLst>
+</pc:chgInfo>
 </file>
 
 <file path=ppt/diagrams/colors1.xml><?xml version="1.0" encoding="utf-8"?>
@@ -1820,9 +2242,16 @@
         <a:lstStyle/>
         <a:p>
           <a:r>
+            <a:rPr lang="en-US" b="1" dirty="0"/>
+            <a:t>Current User State: </a:t>
+          </a:r>
+          <a:r>
             <a:rPr lang="en-US" dirty="0"/>
-            <a:t>Buying the right house is a difficult decision and important investment</a:t>
+            <a:t>Inexperienced home buyers can be limited in resources to accurately predict its true value</a:t>
           </a:r>
+        </a:p>
+        <a:p>
+          <a:endParaRPr lang="en-US" dirty="0"/>
         </a:p>
       </dgm:t>
     </dgm:pt>
@@ -1856,8 +2285,12 @@
         <a:lstStyle/>
         <a:p>
           <a:r>
+            <a:rPr lang="en-US" b="1" dirty="0"/>
+            <a:t>The Goal: </a:t>
+          </a:r>
+          <a:r>
             <a:rPr lang="en-US" dirty="0"/>
-            <a:t>What factors have the greatest impact on the price</a:t>
+            <a:t>create a tool that can accurately predict the price of homes based off of the most important features</a:t>
           </a:r>
         </a:p>
       </dgm:t>
@@ -1892,9 +2325,14 @@
         <a:lstStyle/>
         <a:p>
           <a:r>
-            <a:rPr lang="en-US" dirty="0"/>
-            <a:t>We wanted to create a tool to help home buyers identify undervalued homes in the marketplace</a:t>
+            <a:rPr lang="en-US" b="1" dirty="0"/>
+            <a:t>Benefit:</a:t>
           </a:r>
+          <a:r>
+            <a:rPr lang="en-US" b="0" dirty="0"/>
+            <a:t> An accurate model will allow home buyers to identify undervalued homes and save more money overall</a:t>
+          </a:r>
+          <a:endParaRPr lang="en-US" dirty="0"/>
         </a:p>
       </dgm:t>
     </dgm:pt>
@@ -1966,7 +2404,7 @@
       <dgm:spPr/>
     </dgm:pt>
     <dgm:pt modelId="{B1EBA1F0-F24C-4198-AED3-1A9CC043EBFE}" type="pres">
-      <dgm:prSet presAssocID="{8DD59F17-3802-424D-AC67-A4F303A7B30D}" presName="textRect" presStyleLbl="revTx" presStyleIdx="0" presStyleCnt="3">
+      <dgm:prSet presAssocID="{8DD59F17-3802-424D-AC67-A4F303A7B30D}" presName="textRect" presStyleLbl="revTx" presStyleIdx="0" presStyleCnt="3" custScaleY="133656" custLinFactNeighborX="0" custLinFactNeighborY="779">
         <dgm:presLayoutVars>
           <dgm:chMax val="1"/>
           <dgm:chPref val="1"/>
@@ -1983,7 +2421,7 @@
       <dgm:spPr/>
     </dgm:pt>
     <dgm:pt modelId="{CDF39060-8EE0-4929-8C5A-530008440061}" type="pres">
-      <dgm:prSet presAssocID="{33C17A73-5E92-434B-A7C1-26DD7B9EB722}" presName="iconRect" presStyleLbl="node1" presStyleIdx="1" presStyleCnt="3"/>
+      <dgm:prSet presAssocID="{33C17A73-5E92-434B-A7C1-26DD7B9EB722}" presName="iconRect" presStyleLbl="node1" presStyleIdx="1" presStyleCnt="3" custLinFactX="100000" custLinFactNeighborX="171139" custLinFactNeighborY="1892"/>
       <dgm:spPr>
         <a:blipFill>
           <a:blip xmlns:r="http://schemas.openxmlformats.org/officeDocument/2006/relationships" r:embed="rId3">
@@ -2015,7 +2453,7 @@
       <dgm:spPr/>
     </dgm:pt>
     <dgm:pt modelId="{E5DE5ED9-8F99-4567-AEBD-FD4FD72FBBC3}" type="pres">
-      <dgm:prSet presAssocID="{33C17A73-5E92-434B-A7C1-26DD7B9EB722}" presName="textRect" presStyleLbl="revTx" presStyleIdx="1" presStyleCnt="3">
+      <dgm:prSet presAssocID="{33C17A73-5E92-434B-A7C1-26DD7B9EB722}" presName="textRect" presStyleLbl="revTx" presStyleIdx="1" presStyleCnt="3" custScaleY="133656" custLinFactNeighborX="0" custLinFactNeighborY="779">
         <dgm:presLayoutVars>
           <dgm:chMax val="1"/>
           <dgm:chPref val="1"/>
@@ -2032,7 +2470,7 @@
       <dgm:spPr/>
     </dgm:pt>
     <dgm:pt modelId="{F48E508D-6600-4848-AF74-6CA3A3CBD9D1}" type="pres">
-      <dgm:prSet presAssocID="{B329D340-1C40-4093-A349-F155FA40F911}" presName="iconRect" presStyleLbl="node1" presStyleIdx="2" presStyleCnt="3"/>
+      <dgm:prSet presAssocID="{B329D340-1C40-4093-A349-F155FA40F911}" presName="iconRect" presStyleLbl="node1" presStyleIdx="2" presStyleCnt="3" custLinFactX="-100000" custLinFactNeighborX="-153391" custLinFactNeighborY="1892"/>
       <dgm:spPr>
         <a:blipFill>
           <a:blip xmlns:r="http://schemas.openxmlformats.org/officeDocument/2006/relationships" r:embed="rId5">
@@ -2064,7 +2502,7 @@
       <dgm:spPr/>
     </dgm:pt>
     <dgm:pt modelId="{08F4A330-B857-458E-97F7-F5A7C8C288DD}" type="pres">
-      <dgm:prSet presAssocID="{B329D340-1C40-4093-A349-F155FA40F911}" presName="textRect" presStyleLbl="revTx" presStyleIdx="2" presStyleCnt="3">
+      <dgm:prSet presAssocID="{B329D340-1C40-4093-A349-F155FA40F911}" presName="textRect" presStyleLbl="revTx" presStyleIdx="2" presStyleCnt="3" custScaleY="133656">
         <dgm:presLayoutVars>
           <dgm:chMax val="1"/>
           <dgm:chPref val="1"/>
@@ -2182,9 +2620,10 @@
         <a:lstStyle/>
         <a:p>
           <a:r>
-            <a:rPr lang="en-US" dirty="0"/>
+            <a:rPr lang="en-US"/>
             <a:t>01</a:t>
           </a:r>
+          <a:endParaRPr lang="en-US" dirty="0"/>
         </a:p>
       </dgm:t>
     </dgm:pt>
@@ -2274,7 +2713,7 @@
           </a:pPr>
           <a:r>
             <a:rPr lang="en-US" sz="2000" b="1" dirty="0"/>
-            <a:t>Univariate Regression- </a:t>
+            <a:t>Multivariate Regression- </a:t>
           </a:r>
         </a:p>
         <a:p>
@@ -2289,8 +2728,25 @@
                 </a:schemeClr>
               </a:solidFill>
             </a:rPr>
-            <a:t>We are only trying to predict one outcome</a:t>
+            <a:t>We are only trying to predict one outcome with </a:t>
           </a:r>
+          <a:r>
+            <a:rPr lang="en-US" sz="1600">
+              <a:solidFill>
+                <a:schemeClr val="bg1">
+                  <a:lumMod val="95000"/>
+                </a:schemeClr>
+              </a:solidFill>
+            </a:rPr>
+            <a:t>multiple features</a:t>
+          </a:r>
+          <a:endParaRPr lang="en-US" sz="1600" dirty="0">
+            <a:solidFill>
+              <a:schemeClr val="bg1">
+                <a:lumMod val="95000"/>
+              </a:schemeClr>
+            </a:solidFill>
+          </a:endParaRPr>
         </a:p>
       </dgm:t>
     </dgm:pt>
@@ -2583,7 +3039,7 @@
       </dsp:nvSpPr>
       <dsp:spPr>
         <a:xfrm>
-          <a:off x="1082105" y="878242"/>
+          <a:off x="1082105" y="817662"/>
           <a:ext cx="1485526" cy="1485526"/>
         </a:xfrm>
         <a:prstGeom prst="rect">
@@ -2633,8 +3089,8 @@
       </dsp:nvSpPr>
       <dsp:spPr>
         <a:xfrm>
-          <a:off x="174284" y="2753095"/>
-          <a:ext cx="3301169" cy="720000"/>
+          <a:off x="174284" y="2576961"/>
+          <a:ext cx="3301169" cy="962323"/>
         </a:xfrm>
         <a:prstGeom prst="rect">
           <a:avLst/>
@@ -2663,7 +3119,7 @@
         </a:bodyPr>
         <a:lstStyle/>
         <a:p>
-          <a:pPr marL="0" lvl="0" indent="0" algn="ctr" defTabSz="755650">
+          <a:pPr marL="0" lvl="0" indent="0" algn="ctr" defTabSz="577850">
             <a:lnSpc>
               <a:spcPct val="90000"/>
             </a:lnSpc>
@@ -2676,14 +3132,33 @@
             <a:buNone/>
           </a:pPr>
           <a:r>
-            <a:rPr lang="en-US" sz="1700" kern="1200" dirty="0"/>
-            <a:t>Buying the right house is a difficult decision and important investment</a:t>
+            <a:rPr lang="en-US" sz="1300" b="1" kern="1200" dirty="0"/>
+            <a:t>Current User State: </a:t>
           </a:r>
+          <a:r>
+            <a:rPr lang="en-US" sz="1300" kern="1200" dirty="0"/>
+            <a:t>Inexperienced home buyers can be limited in resources to accurately predict its true value</a:t>
+          </a:r>
+        </a:p>
+        <a:p>
+          <a:pPr marL="0" lvl="0" indent="0" algn="ctr" defTabSz="577850">
+            <a:lnSpc>
+              <a:spcPct val="90000"/>
+            </a:lnSpc>
+            <a:spcBef>
+              <a:spcPct val="0"/>
+            </a:spcBef>
+            <a:spcAft>
+              <a:spcPct val="35000"/>
+            </a:spcAft>
+            <a:buNone/>
+          </a:pPr>
+          <a:endParaRPr lang="en-US" sz="1300" kern="1200" dirty="0"/>
         </a:p>
       </dsp:txBody>
       <dsp:txXfrm>
-        <a:off x="174284" y="2753095"/>
-        <a:ext cx="3301169" cy="720000"/>
+        <a:off x="174284" y="2576961"/>
+        <a:ext cx="3301169" cy="962323"/>
       </dsp:txXfrm>
     </dsp:sp>
     <dsp:sp modelId="{CDF39060-8EE0-4929-8C5A-530008440061}">
@@ -2693,7 +3168,7 @@
       </dsp:nvSpPr>
       <dsp:spPr>
         <a:xfrm>
-          <a:off x="4960980" y="878242"/>
+          <a:off x="8988821" y="845768"/>
           <a:ext cx="1485526" cy="1485526"/>
         </a:xfrm>
         <a:prstGeom prst="rect">
@@ -2743,8 +3218,8 @@
       </dsp:nvSpPr>
       <dsp:spPr>
         <a:xfrm>
-          <a:off x="4053158" y="2753095"/>
-          <a:ext cx="3301169" cy="720000"/>
+          <a:off x="4053158" y="2576961"/>
+          <a:ext cx="3301169" cy="962323"/>
         </a:xfrm>
         <a:prstGeom prst="rect">
           <a:avLst/>
@@ -2773,7 +3248,7 @@
         </a:bodyPr>
         <a:lstStyle/>
         <a:p>
-          <a:pPr marL="0" lvl="0" indent="0" algn="ctr" defTabSz="755650">
+          <a:pPr marL="0" lvl="0" indent="0" algn="ctr" defTabSz="577850">
             <a:lnSpc>
               <a:spcPct val="90000"/>
             </a:lnSpc>
@@ -2786,14 +3261,18 @@
             <a:buNone/>
           </a:pPr>
           <a:r>
-            <a:rPr lang="en-US" sz="1700" kern="1200" dirty="0"/>
-            <a:t>What factors have the greatest impact on the price</a:t>
+            <a:rPr lang="en-US" sz="1300" b="1" kern="1200" dirty="0"/>
+            <a:t>The Goal: </a:t>
+          </a:r>
+          <a:r>
+            <a:rPr lang="en-US" sz="1300" kern="1200" dirty="0"/>
+            <a:t>create a tool that can accurately predict the price of homes based off of the most important features</a:t>
           </a:r>
         </a:p>
       </dsp:txBody>
       <dsp:txXfrm>
-        <a:off x="4053158" y="2753095"/>
-        <a:ext cx="3301169" cy="720000"/>
+        <a:off x="4053158" y="2576961"/>
+        <a:ext cx="3301169" cy="962323"/>
       </dsp:txXfrm>
     </dsp:sp>
     <dsp:sp modelId="{F48E508D-6600-4848-AF74-6CA3A3CBD9D1}">
@@ -2803,7 +3282,7 @@
       </dsp:nvSpPr>
       <dsp:spPr>
         <a:xfrm>
-          <a:off x="8839854" y="878242"/>
+          <a:off x="5075664" y="845768"/>
           <a:ext cx="1485526" cy="1485526"/>
         </a:xfrm>
         <a:prstGeom prst="rect">
@@ -2853,8 +3332,8 @@
       </dsp:nvSpPr>
       <dsp:spPr>
         <a:xfrm>
-          <a:off x="7932033" y="2753095"/>
-          <a:ext cx="3301169" cy="720000"/>
+          <a:off x="7932033" y="2571352"/>
+          <a:ext cx="3301169" cy="962323"/>
         </a:xfrm>
         <a:prstGeom prst="rect">
           <a:avLst/>
@@ -2883,7 +3362,7 @@
         </a:bodyPr>
         <a:lstStyle/>
         <a:p>
-          <a:pPr marL="0" lvl="0" indent="0" algn="ctr" defTabSz="755650">
+          <a:pPr marL="0" lvl="0" indent="0" algn="ctr" defTabSz="577850">
             <a:lnSpc>
               <a:spcPct val="90000"/>
             </a:lnSpc>
@@ -2896,14 +3375,19 @@
             <a:buNone/>
           </a:pPr>
           <a:r>
-            <a:rPr lang="en-US" sz="1700" kern="1200" dirty="0"/>
-            <a:t>We wanted to create a tool to help home buyers identify undervalued homes in the marketplace</a:t>
+            <a:rPr lang="en-US" sz="1300" b="1" kern="1200" dirty="0"/>
+            <a:t>Benefit:</a:t>
           </a:r>
+          <a:r>
+            <a:rPr lang="en-US" sz="1300" b="0" kern="1200" dirty="0"/>
+            <a:t> An accurate model will allow home buyers to identify undervalued homes and save more money overall</a:t>
+          </a:r>
+          <a:endParaRPr lang="en-US" sz="1300" kern="1200" dirty="0"/>
         </a:p>
       </dsp:txBody>
       <dsp:txXfrm>
-        <a:off x="7932033" y="2753095"/>
-        <a:ext cx="3301169" cy="720000"/>
+        <a:off x="7932033" y="2571352"/>
+        <a:ext cx="3301169" cy="962323"/>
       </dsp:txXfrm>
     </dsp:sp>
   </dsp:spTree>
@@ -3079,9 +3563,10 @@
             <a:buNone/>
           </a:pPr>
           <a:r>
-            <a:rPr lang="en-US" sz="6100" kern="1200" dirty="0"/>
+            <a:rPr lang="en-US" sz="6100" kern="1200"/>
             <a:t>01</a:t>
           </a:r>
+          <a:endParaRPr lang="en-US" sz="6100" kern="1200" dirty="0"/>
         </a:p>
       </dsp:txBody>
       <dsp:txXfrm>
@@ -3327,7 +3812,7 @@
           </a:pPr>
           <a:r>
             <a:rPr lang="en-US" sz="2000" b="1" kern="1200" dirty="0"/>
-            <a:t>Univariate Regression- </a:t>
+            <a:t>Multivariate Regression- </a:t>
           </a:r>
         </a:p>
         <a:p>
@@ -3352,8 +3837,25 @@
                 </a:schemeClr>
               </a:solidFill>
             </a:rPr>
-            <a:t>We are only trying to predict one outcome</a:t>
+            <a:t>We are only trying to predict one outcome with </a:t>
           </a:r>
+          <a:r>
+            <a:rPr lang="en-US" sz="1600" kern="1200">
+              <a:solidFill>
+                <a:schemeClr val="bg1">
+                  <a:lumMod val="95000"/>
+                </a:schemeClr>
+              </a:solidFill>
+            </a:rPr>
+            <a:t>multiple features</a:t>
+          </a:r>
+          <a:endParaRPr lang="en-US" sz="1600" kern="1200" dirty="0">
+            <a:solidFill>
+              <a:schemeClr val="bg1">
+                <a:lumMod val="95000"/>
+              </a:schemeClr>
+            </a:solidFill>
+          </a:endParaRPr>
         </a:p>
       </dsp:txBody>
       <dsp:txXfrm>
@@ -6257,7 +6759,7 @@
           <a:p>
             <a:fld id="{ED8432B9-F267-4BB4-8016-598C6BD35936}" type="datetimeFigureOut">
               <a:rPr lang="en-US" smtClean="0"/>
-              <a:t>7/19/2020</a:t>
+              <a:t>7/25/2020</a:t>
             </a:fld>
             <a:endParaRPr lang="en-US"/>
           </a:p>
@@ -6455,7 +6957,7 @@
           <a:p>
             <a:fld id="{ED8432B9-F267-4BB4-8016-598C6BD35936}" type="datetimeFigureOut">
               <a:rPr lang="en-US" smtClean="0"/>
-              <a:t>7/19/2020</a:t>
+              <a:t>7/25/2020</a:t>
             </a:fld>
             <a:endParaRPr lang="en-US"/>
           </a:p>
@@ -6663,7 +7165,7 @@
           <a:p>
             <a:fld id="{ED8432B9-F267-4BB4-8016-598C6BD35936}" type="datetimeFigureOut">
               <a:rPr lang="en-US" smtClean="0"/>
-              <a:t>7/19/2020</a:t>
+              <a:t>7/25/2020</a:t>
             </a:fld>
             <a:endParaRPr lang="en-US"/>
           </a:p>
@@ -6861,7 +7363,7 @@
           <a:p>
             <a:fld id="{ED8432B9-F267-4BB4-8016-598C6BD35936}" type="datetimeFigureOut">
               <a:rPr lang="en-US" smtClean="0"/>
-              <a:t>7/19/2020</a:t>
+              <a:t>7/25/2020</a:t>
             </a:fld>
             <a:endParaRPr lang="en-US"/>
           </a:p>
@@ -7136,7 +7638,7 @@
           <a:p>
             <a:fld id="{ED8432B9-F267-4BB4-8016-598C6BD35936}" type="datetimeFigureOut">
               <a:rPr lang="en-US" smtClean="0"/>
-              <a:t>7/19/2020</a:t>
+              <a:t>7/25/2020</a:t>
             </a:fld>
             <a:endParaRPr lang="en-US"/>
           </a:p>
@@ -7401,7 +7903,7 @@
           <a:p>
             <a:fld id="{ED8432B9-F267-4BB4-8016-598C6BD35936}" type="datetimeFigureOut">
               <a:rPr lang="en-US" smtClean="0"/>
-              <a:t>7/19/2020</a:t>
+              <a:t>7/25/2020</a:t>
             </a:fld>
             <a:endParaRPr lang="en-US"/>
           </a:p>
@@ -7813,7 +8315,7 @@
           <a:p>
             <a:fld id="{ED8432B9-F267-4BB4-8016-598C6BD35936}" type="datetimeFigureOut">
               <a:rPr lang="en-US" smtClean="0"/>
-              <a:t>7/19/2020</a:t>
+              <a:t>7/25/2020</a:t>
             </a:fld>
             <a:endParaRPr lang="en-US"/>
           </a:p>
@@ -7954,7 +8456,7 @@
           <a:p>
             <a:fld id="{ED8432B9-F267-4BB4-8016-598C6BD35936}" type="datetimeFigureOut">
               <a:rPr lang="en-US" smtClean="0"/>
-              <a:t>7/19/2020</a:t>
+              <a:t>7/25/2020</a:t>
             </a:fld>
             <a:endParaRPr lang="en-US"/>
           </a:p>
@@ -8067,7 +8569,7 @@
           <a:p>
             <a:fld id="{ED8432B9-F267-4BB4-8016-598C6BD35936}" type="datetimeFigureOut">
               <a:rPr lang="en-US" smtClean="0"/>
-              <a:t>7/19/2020</a:t>
+              <a:t>7/25/2020</a:t>
             </a:fld>
             <a:endParaRPr lang="en-US"/>
           </a:p>
@@ -8378,7 +8880,7 @@
           <a:p>
             <a:fld id="{ED8432B9-F267-4BB4-8016-598C6BD35936}" type="datetimeFigureOut">
               <a:rPr lang="en-US" smtClean="0"/>
-              <a:t>7/19/2020</a:t>
+              <a:t>7/25/2020</a:t>
             </a:fld>
             <a:endParaRPr lang="en-US"/>
           </a:p>
@@ -8666,7 +9168,7 @@
           <a:p>
             <a:fld id="{ED8432B9-F267-4BB4-8016-598C6BD35936}" type="datetimeFigureOut">
               <a:rPr lang="en-US" smtClean="0"/>
-              <a:t>7/19/2020</a:t>
+              <a:t>7/25/2020</a:t>
             </a:fld>
             <a:endParaRPr lang="en-US"/>
           </a:p>
@@ -8907,7 +9409,7 @@
           <a:p>
             <a:fld id="{ED8432B9-F267-4BB4-8016-598C6BD35936}" type="datetimeFigureOut">
               <a:rPr lang="en-US" smtClean="0"/>
-              <a:t>7/19/2020</a:t>
+              <a:t>7/25/2020</a:t>
             </a:fld>
             <a:endParaRPr lang="en-US"/>
           </a:p>
@@ -12534,7 +13036,7 @@
         </p:nvSpPr>
         <p:spPr>
           <a:xfrm>
-            <a:off x="0" y="0"/>
+            <a:off x="-44879" y="0"/>
             <a:ext cx="12192000" cy="1116353"/>
           </a:xfrm>
           <a:prstGeom prst="rect">
@@ -12600,52 +13102,17 @@
                   <a:schemeClr val="bg1"/>
                 </a:solidFill>
               </a:rPr>
-              <a:t>Standard Linear Regression</a:t>
-            </a:r>
-          </a:p>
-        </p:txBody>
-      </p:sp>
-      <p:sp>
-        <p:nvSpPr>
-          <p:cNvPr id="8" name="TextBox 7">
-            <a:extLst>
-              <a:ext uri="{FF2B5EF4-FFF2-40B4-BE49-F238E27FC236}">
-                <a16:creationId xmlns:a16="http://schemas.microsoft.com/office/drawing/2014/main" id="{63BE62FE-4449-4620-8637-C3A25776BEB7}"/>
-              </a:ext>
-            </a:extLst>
-          </p:cNvPr>
-          <p:cNvSpPr txBox="1"/>
-          <p:nvPr/>
-        </p:nvSpPr>
-        <p:spPr>
-          <a:xfrm>
-            <a:off x="712664" y="2765639"/>
-            <a:ext cx="4005408" cy="923330"/>
-          </a:xfrm>
-          <a:prstGeom prst="rect">
-            <a:avLst/>
-          </a:prstGeom>
-          <a:noFill/>
-        </p:spPr>
-        <p:txBody>
-          <a:bodyPr wrap="square" rtlCol="0">
-            <a:spAutoFit/>
-          </a:bodyPr>
-          <a:lstStyle/>
-          <a:p>
-            <a:r>
-              <a:rPr lang="en-US" dirty="0"/>
-              <a:t>Recursive feature elimination revealed that this model may have had too many features included in it for its prediction</a:t>
+              <a:t>Daniel</a:t>
             </a:r>
           </a:p>
         </p:txBody>
       </p:sp>
       <p:pic>
         <p:nvPicPr>
-          <p:cNvPr id="10" name="Picture 9">
+          <p:cNvPr id="5" name="Picture 4" descr="A screenshot of a cell phone&#10;&#10;Description automatically generated">
             <a:extLst>
               <a:ext uri="{FF2B5EF4-FFF2-40B4-BE49-F238E27FC236}">
-                <a16:creationId xmlns:a16="http://schemas.microsoft.com/office/drawing/2014/main" id="{A554C847-A449-4647-8387-BA312FF6FAB4}"/>
+                <a16:creationId xmlns:a16="http://schemas.microsoft.com/office/drawing/2014/main" id="{1E900DA0-3E90-4139-8F4E-D96110474537}"/>
               </a:ext>
             </a:extLst>
           </p:cNvPr>
@@ -12655,15 +13122,57 @@
           <p:nvPr/>
         </p:nvPicPr>
         <p:blipFill>
-          <a:blip r:embed="rId2"/>
+          <a:blip r:embed="rId2">
+            <a:extLst>
+              <a:ext uri="{28A0092B-C50C-407E-A947-70E740481C1C}">
+                <a14:useLocalDpi xmlns:a14="http://schemas.microsoft.com/office/drawing/2010/main" val="0"/>
+              </a:ext>
+            </a:extLst>
+          </a:blip>
           <a:stretch>
             <a:fillRect/>
           </a:stretch>
         </p:blipFill>
         <p:spPr>
           <a:xfrm>
-            <a:off x="6554911" y="1936759"/>
-            <a:ext cx="4924425" cy="3152775"/>
+            <a:off x="193891" y="1343818"/>
+            <a:ext cx="5011155" cy="5242084"/>
+          </a:xfrm>
+          <a:prstGeom prst="rect">
+            <a:avLst/>
+          </a:prstGeom>
+        </p:spPr>
+      </p:pic>
+      <p:pic>
+        <p:nvPicPr>
+          <p:cNvPr id="9" name="Picture 8" descr="A close up of a pencil&#10;&#10;Description automatically generated">
+            <a:extLst>
+              <a:ext uri="{FF2B5EF4-FFF2-40B4-BE49-F238E27FC236}">
+                <a16:creationId xmlns:a16="http://schemas.microsoft.com/office/drawing/2014/main" id="{F9E74DDC-8D2E-4D63-8C27-360C297240B2}"/>
+              </a:ext>
+            </a:extLst>
+          </p:cNvPr>
+          <p:cNvPicPr>
+            <a:picLocks noChangeAspect="1"/>
+          </p:cNvPicPr>
+          <p:nvPr/>
+        </p:nvPicPr>
+        <p:blipFill>
+          <a:blip r:embed="rId3">
+            <a:extLst>
+              <a:ext uri="{28A0092B-C50C-407E-A947-70E740481C1C}">
+                <a14:useLocalDpi xmlns:a14="http://schemas.microsoft.com/office/drawing/2010/main" val="0"/>
+              </a:ext>
+            </a:extLst>
+          </a:blip>
+          <a:stretch>
+            <a:fillRect/>
+          </a:stretch>
+        </p:blipFill>
+        <p:spPr>
+          <a:xfrm>
+            <a:off x="6096000" y="1599783"/>
+            <a:ext cx="5487650" cy="3658433"/>
           </a:xfrm>
           <a:prstGeom prst="rect">
             <a:avLst/>
@@ -12673,7 +13182,7 @@
     </p:spTree>
     <p:extLst>
       <p:ext uri="{BB962C8B-B14F-4D97-AF65-F5344CB8AC3E}">
-        <p14:creationId xmlns:p14="http://schemas.microsoft.com/office/powerpoint/2010/main" val="3652284154"/>
+        <p14:creationId xmlns:p14="http://schemas.microsoft.com/office/powerpoint/2010/main" val="36800252"/>
       </p:ext>
     </p:extLst>
   </p:cSld>
@@ -12780,15 +13289,526 @@
                   <a:schemeClr val="bg1"/>
                 </a:solidFill>
               </a:rPr>
-              <a:t>Nate</a:t>
+              <a:t>Comparison</a:t>
             </a:r>
           </a:p>
         </p:txBody>
       </p:sp>
+      <p:graphicFrame>
+        <p:nvGraphicFramePr>
+          <p:cNvPr id="6" name="Table 7">
+            <a:extLst>
+              <a:ext uri="{FF2B5EF4-FFF2-40B4-BE49-F238E27FC236}">
+                <a16:creationId xmlns:a16="http://schemas.microsoft.com/office/drawing/2014/main" id="{7819E364-B57A-4ECC-9534-5820EC4E45D8}"/>
+              </a:ext>
+            </a:extLst>
+          </p:cNvPr>
+          <p:cNvGraphicFramePr>
+            <a:graphicFrameLocks noGrp="1"/>
+          </p:cNvGraphicFramePr>
+          <p:nvPr>
+            <p:extLst>
+              <p:ext uri="{D42A27DB-BD31-4B8C-83A1-F6EECF244321}">
+                <p14:modId xmlns:p14="http://schemas.microsoft.com/office/powerpoint/2010/main" val="1230842020"/>
+              </p:ext>
+            </p:extLst>
+          </p:nvPr>
+        </p:nvGraphicFramePr>
+        <p:xfrm>
+          <a:off x="305267" y="1538918"/>
+          <a:ext cx="11549470" cy="4905166"/>
+        </p:xfrm>
+        <a:graphic>
+          <a:graphicData uri="http://schemas.openxmlformats.org/drawingml/2006/table">
+            <a:tbl>
+              <a:tblPr firstRow="1" bandRow="1">
+                <a:tableStyleId>{5C22544A-7EE6-4342-B048-85BDC9FD1C3A}</a:tableStyleId>
+              </a:tblPr>
+              <a:tblGrid>
+                <a:gridCol w="2309894">
+                  <a:extLst>
+                    <a:ext uri="{9D8B030D-6E8A-4147-A177-3AD203B41FA5}">
+                      <a16:colId xmlns:a16="http://schemas.microsoft.com/office/drawing/2014/main" val="3260486839"/>
+                    </a:ext>
+                  </a:extLst>
+                </a:gridCol>
+                <a:gridCol w="2309894">
+                  <a:extLst>
+                    <a:ext uri="{9D8B030D-6E8A-4147-A177-3AD203B41FA5}">
+                      <a16:colId xmlns:a16="http://schemas.microsoft.com/office/drawing/2014/main" val="3474592732"/>
+                    </a:ext>
+                  </a:extLst>
+                </a:gridCol>
+                <a:gridCol w="2309894">
+                  <a:extLst>
+                    <a:ext uri="{9D8B030D-6E8A-4147-A177-3AD203B41FA5}">
+                      <a16:colId xmlns:a16="http://schemas.microsoft.com/office/drawing/2014/main" val="3937758776"/>
+                    </a:ext>
+                  </a:extLst>
+                </a:gridCol>
+                <a:gridCol w="2309894">
+                  <a:extLst>
+                    <a:ext uri="{9D8B030D-6E8A-4147-A177-3AD203B41FA5}">
+                      <a16:colId xmlns:a16="http://schemas.microsoft.com/office/drawing/2014/main" val="649256819"/>
+                    </a:ext>
+                  </a:extLst>
+                </a:gridCol>
+                <a:gridCol w="2309894">
+                  <a:extLst>
+                    <a:ext uri="{9D8B030D-6E8A-4147-A177-3AD203B41FA5}">
+                      <a16:colId xmlns:a16="http://schemas.microsoft.com/office/drawing/2014/main" val="4239656414"/>
+                    </a:ext>
+                  </a:extLst>
+                </a:gridCol>
+              </a:tblGrid>
+              <a:tr h="818845">
+                <a:tc>
+                  <a:txBody>
+                    <a:bodyPr/>
+                    <a:lstStyle/>
+                    <a:p>
+                      <a:r>
+                        <a:rPr lang="en-US" dirty="0"/>
+                        <a:t>Model</a:t>
+                      </a:r>
+                    </a:p>
+                  </a:txBody>
+                  <a:tcPr/>
+                </a:tc>
+                <a:tc>
+                  <a:txBody>
+                    <a:bodyPr/>
+                    <a:lstStyle/>
+                    <a:p>
+                      <a:r>
+                        <a:rPr lang="en-US" dirty="0"/>
+                        <a:t>No. Features</a:t>
+                      </a:r>
+                    </a:p>
+                  </a:txBody>
+                  <a:tcPr/>
+                </a:tc>
+                <a:tc>
+                  <a:txBody>
+                    <a:bodyPr/>
+                    <a:lstStyle/>
+                    <a:p>
+                      <a:r>
+                        <a:rPr lang="en-US" dirty="0"/>
+                        <a:t>Training R</a:t>
+                      </a:r>
+                      <a:r>
+                        <a:rPr lang="en-US" baseline="30000" dirty="0"/>
+                        <a:t>2</a:t>
+                      </a:r>
+                    </a:p>
+                  </a:txBody>
+                  <a:tcPr/>
+                </a:tc>
+                <a:tc>
+                  <a:txBody>
+                    <a:bodyPr/>
+                    <a:lstStyle/>
+                    <a:p>
+                      <a:r>
+                        <a:rPr lang="en-US" dirty="0"/>
+                        <a:t>Testing R</a:t>
+                      </a:r>
+                      <a:r>
+                        <a:rPr lang="en-US" baseline="30000" dirty="0"/>
+                        <a:t>2</a:t>
+                      </a:r>
+                    </a:p>
+                  </a:txBody>
+                  <a:tcPr/>
+                </a:tc>
+                <a:tc>
+                  <a:txBody>
+                    <a:bodyPr/>
+                    <a:lstStyle/>
+                    <a:p>
+                      <a:r>
+                        <a:rPr lang="en-US" dirty="0"/>
+                        <a:t>MSE</a:t>
+                      </a:r>
+                    </a:p>
+                  </a:txBody>
+                  <a:tcPr/>
+                </a:tc>
+                <a:extLst>
+                  <a:ext uri="{0D108BD9-81ED-4DB2-BD59-A6C34878D82A}">
+                    <a16:rowId xmlns:a16="http://schemas.microsoft.com/office/drawing/2014/main" val="3361153478"/>
+                  </a:ext>
+                </a:extLst>
+              </a:tr>
+              <a:tr h="818845">
+                <a:tc>
+                  <a:txBody>
+                    <a:bodyPr/>
+                    <a:lstStyle/>
+                    <a:p>
+                      <a:r>
+                        <a:rPr lang="en-US" dirty="0"/>
+                        <a:t>Simple Model</a:t>
+                      </a:r>
+                    </a:p>
+                  </a:txBody>
+                  <a:tcPr/>
+                </a:tc>
+                <a:tc>
+                  <a:txBody>
+                    <a:bodyPr/>
+                    <a:lstStyle/>
+                    <a:p>
+                      <a:r>
+                        <a:rPr lang="en-US" dirty="0"/>
+                        <a:t>1</a:t>
+                      </a:r>
+                    </a:p>
+                  </a:txBody>
+                  <a:tcPr/>
+                </a:tc>
+                <a:tc>
+                  <a:txBody>
+                    <a:bodyPr/>
+                    <a:lstStyle/>
+                    <a:p>
+                      <a:r>
+                        <a:rPr lang="en-US" dirty="0"/>
+                        <a:t>0.618</a:t>
+                      </a:r>
+                    </a:p>
+                  </a:txBody>
+                  <a:tcPr/>
+                </a:tc>
+                <a:tc>
+                  <a:txBody>
+                    <a:bodyPr/>
+                    <a:lstStyle/>
+                    <a:p>
+                      <a:r>
+                        <a:rPr lang="en-US" dirty="0"/>
+                        <a:t>0.686</a:t>
+                      </a:r>
+                    </a:p>
+                  </a:txBody>
+                  <a:tcPr/>
+                </a:tc>
+                <a:tc>
+                  <a:txBody>
+                    <a:bodyPr/>
+                    <a:lstStyle/>
+                    <a:p>
+                      <a:r>
+                        <a:rPr lang="en-US" dirty="0"/>
+                        <a:t>1814796444.73</a:t>
+                      </a:r>
+                    </a:p>
+                  </a:txBody>
+                  <a:tcPr/>
+                </a:tc>
+                <a:extLst>
+                  <a:ext uri="{0D108BD9-81ED-4DB2-BD59-A6C34878D82A}">
+                    <a16:rowId xmlns:a16="http://schemas.microsoft.com/office/drawing/2014/main" val="925304350"/>
+                  </a:ext>
+                </a:extLst>
+              </a:tr>
+              <a:tr h="818845">
+                <a:tc>
+                  <a:txBody>
+                    <a:bodyPr/>
+                    <a:lstStyle/>
+                    <a:p>
+                      <a:r>
+                        <a:rPr lang="en-US" dirty="0"/>
+                        <a:t>Random Forest</a:t>
+                      </a:r>
+                    </a:p>
+                  </a:txBody>
+                  <a:tcPr/>
+                </a:tc>
+                <a:tc>
+                  <a:txBody>
+                    <a:bodyPr/>
+                    <a:lstStyle/>
+                    <a:p>
+                      <a:r>
+                        <a:rPr lang="en-US" dirty="0"/>
+                        <a:t>10</a:t>
+                      </a:r>
+                    </a:p>
+                  </a:txBody>
+                  <a:tcPr/>
+                </a:tc>
+                <a:tc>
+                  <a:txBody>
+                    <a:bodyPr/>
+                    <a:lstStyle/>
+                    <a:p>
+                      <a:r>
+                        <a:rPr lang="en-US" dirty="0"/>
+                        <a:t>0.978</a:t>
+                      </a:r>
+                    </a:p>
+                  </a:txBody>
+                  <a:tcPr/>
+                </a:tc>
+                <a:tc>
+                  <a:txBody>
+                    <a:bodyPr/>
+                    <a:lstStyle/>
+                    <a:p>
+                      <a:r>
+                        <a:rPr lang="en-US" dirty="0"/>
+                        <a:t>0.867</a:t>
+                      </a:r>
+                    </a:p>
+                  </a:txBody>
+                  <a:tcPr/>
+                </a:tc>
+                <a:tc>
+                  <a:txBody>
+                    <a:bodyPr/>
+                    <a:lstStyle/>
+                    <a:p>
+                      <a:r>
+                        <a:rPr lang="en-US" dirty="0"/>
+                        <a:t>729555657.23</a:t>
+                      </a:r>
+                    </a:p>
+                  </a:txBody>
+                  <a:tcPr/>
+                </a:tc>
+                <a:extLst>
+                  <a:ext uri="{0D108BD9-81ED-4DB2-BD59-A6C34878D82A}">
+                    <a16:rowId xmlns:a16="http://schemas.microsoft.com/office/drawing/2014/main" val="2022247101"/>
+                  </a:ext>
+                </a:extLst>
+              </a:tr>
+              <a:tr h="823238">
+                <a:tc>
+                  <a:txBody>
+                    <a:bodyPr/>
+                    <a:lstStyle/>
+                    <a:p>
+                      <a:r>
+                        <a:rPr lang="en-US" dirty="0"/>
+                        <a:t>Random Forest CV</a:t>
+                      </a:r>
+                    </a:p>
+                  </a:txBody>
+                  <a:tcPr/>
+                </a:tc>
+                <a:tc>
+                  <a:txBody>
+                    <a:bodyPr/>
+                    <a:lstStyle/>
+                    <a:p>
+                      <a:r>
+                        <a:rPr lang="en-US" dirty="0"/>
+                        <a:t>10</a:t>
+                      </a:r>
+                    </a:p>
+                  </a:txBody>
+                  <a:tcPr/>
+                </a:tc>
+                <a:tc>
+                  <a:txBody>
+                    <a:bodyPr/>
+                    <a:lstStyle/>
+                    <a:p>
+                      <a:r>
+                        <a:rPr lang="en-US" dirty="0"/>
+                        <a:t>0.917</a:t>
+                      </a:r>
+                    </a:p>
+                  </a:txBody>
+                  <a:tcPr/>
+                </a:tc>
+                <a:tc>
+                  <a:txBody>
+                    <a:bodyPr/>
+                    <a:lstStyle/>
+                    <a:p>
+                      <a:r>
+                        <a:rPr lang="en-US" dirty="0"/>
+                        <a:t>0.883</a:t>
+                      </a:r>
+                    </a:p>
+                  </a:txBody>
+                  <a:tcPr/>
+                </a:tc>
+                <a:tc>
+                  <a:txBody>
+                    <a:bodyPr/>
+                    <a:lstStyle/>
+                    <a:p>
+                      <a:r>
+                        <a:rPr lang="en-US" dirty="0"/>
+                        <a:t>654125368.41</a:t>
+                      </a:r>
+                    </a:p>
+                  </a:txBody>
+                  <a:tcPr/>
+                </a:tc>
+                <a:extLst>
+                  <a:ext uri="{0D108BD9-81ED-4DB2-BD59-A6C34878D82A}">
+                    <a16:rowId xmlns:a16="http://schemas.microsoft.com/office/drawing/2014/main" val="3253341911"/>
+                  </a:ext>
+                </a:extLst>
+              </a:tr>
+              <a:tr h="806548">
+                <a:tc>
+                  <a:txBody>
+                    <a:bodyPr/>
+                    <a:lstStyle/>
+                    <a:p>
+                      <a:r>
+                        <a:rPr lang="en-US" dirty="0"/>
+                        <a:t>Lasso</a:t>
+                      </a:r>
+                    </a:p>
+                  </a:txBody>
+                  <a:tcPr/>
+                </a:tc>
+                <a:tc>
+                  <a:txBody>
+                    <a:bodyPr/>
+                    <a:lstStyle/>
+                    <a:p>
+                      <a:r>
+                        <a:rPr lang="en-US" dirty="0"/>
+                        <a:t>15</a:t>
+                      </a:r>
+                    </a:p>
+                  </a:txBody>
+                  <a:tcPr/>
+                </a:tc>
+                <a:tc>
+                  <a:txBody>
+                    <a:bodyPr/>
+                    <a:lstStyle/>
+                    <a:p>
+                      <a:r>
+                        <a:rPr lang="en-US" dirty="0"/>
+                        <a:t>0.834</a:t>
+                      </a:r>
+                    </a:p>
+                  </a:txBody>
+                  <a:tcPr/>
+                </a:tc>
+                <a:tc>
+                  <a:txBody>
+                    <a:bodyPr/>
+                    <a:lstStyle/>
+                    <a:p>
+                      <a:r>
+                        <a:rPr lang="en-US" dirty="0"/>
+                        <a:t>0.865</a:t>
+                      </a:r>
+                    </a:p>
+                  </a:txBody>
+                  <a:tcPr/>
+                </a:tc>
+                <a:tc>
+                  <a:txBody>
+                    <a:bodyPr/>
+                    <a:lstStyle/>
+                    <a:p>
+                      <a:r>
+                        <a:rPr lang="en-US" dirty="0"/>
+                        <a:t>0.145</a:t>
+                      </a:r>
+                    </a:p>
+                  </a:txBody>
+                  <a:tcPr/>
+                </a:tc>
+                <a:extLst>
+                  <a:ext uri="{0D108BD9-81ED-4DB2-BD59-A6C34878D82A}">
+                    <a16:rowId xmlns:a16="http://schemas.microsoft.com/office/drawing/2014/main" val="2145328924"/>
+                  </a:ext>
+                </a:extLst>
+              </a:tr>
+              <a:tr h="818845">
+                <a:tc>
+                  <a:txBody>
+                    <a:bodyPr/>
+                    <a:lstStyle/>
+                    <a:p>
+                      <a:r>
+                        <a:rPr lang="en-US" dirty="0"/>
+                        <a:t>OLS</a:t>
+                      </a:r>
+                    </a:p>
+                  </a:txBody>
+                  <a:tcPr/>
+                </a:tc>
+                <a:tc>
+                  <a:txBody>
+                    <a:bodyPr/>
+                    <a:lstStyle/>
+                    <a:p>
+                      <a:r>
+                        <a:rPr lang="en-US" dirty="0"/>
+                        <a:t>33</a:t>
+                      </a:r>
+                    </a:p>
+                  </a:txBody>
+                  <a:tcPr/>
+                </a:tc>
+                <a:tc>
+                  <a:txBody>
+                    <a:bodyPr/>
+                    <a:lstStyle/>
+                    <a:p>
+                      <a:r>
+                        <a:rPr lang="en-US" dirty="0"/>
+                        <a:t>0.913</a:t>
+                      </a:r>
+                    </a:p>
+                  </a:txBody>
+                  <a:tcPr/>
+                </a:tc>
+                <a:tc>
+                  <a:txBody>
+                    <a:bodyPr/>
+                    <a:lstStyle/>
+                    <a:p>
+                      <a:r>
+                        <a:rPr lang="en-US" dirty="0"/>
+                        <a:t>0.900</a:t>
+                      </a:r>
+                    </a:p>
+                  </a:txBody>
+                  <a:tcPr/>
+                </a:tc>
+                <a:tc>
+                  <a:txBody>
+                    <a:bodyPr/>
+                    <a:lstStyle/>
+                    <a:p>
+                      <a:r>
+                        <a:rPr lang="en-US" dirty="0"/>
+                        <a:t>0.094</a:t>
+                      </a:r>
+                    </a:p>
+                  </a:txBody>
+                  <a:tcPr/>
+                </a:tc>
+                <a:extLst>
+                  <a:ext uri="{0D108BD9-81ED-4DB2-BD59-A6C34878D82A}">
+                    <a16:rowId xmlns:a16="http://schemas.microsoft.com/office/drawing/2014/main" val="1649054804"/>
+                  </a:ext>
+                </a:extLst>
+              </a:tr>
+            </a:tbl>
+          </a:graphicData>
+        </a:graphic>
+      </p:graphicFrame>
     </p:spTree>
     <p:extLst>
       <p:ext uri="{BB962C8B-B14F-4D97-AF65-F5344CB8AC3E}">
-        <p14:creationId xmlns:p14="http://schemas.microsoft.com/office/powerpoint/2010/main" val="1493901860"/>
+        <p14:creationId xmlns:p14="http://schemas.microsoft.com/office/powerpoint/2010/main" val="4130535459"/>
       </p:ext>
     </p:extLst>
   </p:cSld>
@@ -12895,7 +13915,7 @@
                   <a:schemeClr val="bg1"/>
                 </a:solidFill>
               </a:rPr>
-              <a:t>Daniel</a:t>
+              <a:t>Backmatter</a:t>
             </a:r>
           </a:p>
         </p:txBody>
@@ -12903,7 +13923,498 @@
     </p:spTree>
     <p:extLst>
       <p:ext uri="{BB962C8B-B14F-4D97-AF65-F5344CB8AC3E}">
-        <p14:creationId xmlns:p14="http://schemas.microsoft.com/office/powerpoint/2010/main" val="1149495627"/>
+        <p14:creationId xmlns:p14="http://schemas.microsoft.com/office/powerpoint/2010/main" val="567204623"/>
+      </p:ext>
+    </p:extLst>
+  </p:cSld>
+  <p:clrMapOvr>
+    <a:masterClrMapping/>
+  </p:clrMapOvr>
+</p:sld>
+</file>
+
+<file path=ppt/slides/slide13.xml><?xml version="1.0" encoding="utf-8"?>
+<p:sld xmlns:a="http://schemas.openxmlformats.org/drawingml/2006/main" xmlns:r="http://schemas.openxmlformats.org/officeDocument/2006/relationships" xmlns:p="http://schemas.openxmlformats.org/presentationml/2006/main">
+  <p:cSld>
+    <p:spTree>
+      <p:nvGrpSpPr>
+        <p:cNvPr id="1" name=""/>
+        <p:cNvGrpSpPr/>
+        <p:nvPr/>
+      </p:nvGrpSpPr>
+      <p:grpSpPr>
+        <a:xfrm>
+          <a:off x="0" y="0"/>
+          <a:ext cx="0" cy="0"/>
+          <a:chOff x="0" y="0"/>
+          <a:chExt cx="0" cy="0"/>
+        </a:xfrm>
+      </p:grpSpPr>
+      <p:sp>
+        <p:nvSpPr>
+          <p:cNvPr id="4" name="Rectangle 3">
+            <a:extLst>
+              <a:ext uri="{FF2B5EF4-FFF2-40B4-BE49-F238E27FC236}">
+                <a16:creationId xmlns:a16="http://schemas.microsoft.com/office/drawing/2014/main" id="{336DBEF0-7328-48E9-BF82-299017D4364D}"/>
+              </a:ext>
+            </a:extLst>
+          </p:cNvPr>
+          <p:cNvSpPr/>
+          <p:nvPr/>
+        </p:nvSpPr>
+        <p:spPr>
+          <a:xfrm>
+            <a:off x="0" y="0"/>
+            <a:ext cx="12192000" cy="1116353"/>
+          </a:xfrm>
+          <a:prstGeom prst="rect">
+            <a:avLst/>
+          </a:prstGeom>
+        </p:spPr>
+        <p:style>
+          <a:lnRef idx="2">
+            <a:schemeClr val="accent1">
+              <a:shade val="50000"/>
+            </a:schemeClr>
+          </a:lnRef>
+          <a:fillRef idx="1">
+            <a:schemeClr val="accent1"/>
+          </a:fillRef>
+          <a:effectRef idx="0">
+            <a:schemeClr val="accent1"/>
+          </a:effectRef>
+          <a:fontRef idx="minor">
+            <a:schemeClr val="lt1"/>
+          </a:fontRef>
+        </p:style>
+        <p:txBody>
+          <a:bodyPr rtlCol="0" anchor="ctr"/>
+          <a:lstStyle/>
+          <a:p>
+            <a:pPr algn="ctr"/>
+            <a:endParaRPr lang="en-US"/>
+          </a:p>
+        </p:txBody>
+      </p:sp>
+      <p:sp>
+        <p:nvSpPr>
+          <p:cNvPr id="2" name="Title 1">
+            <a:extLst>
+              <a:ext uri="{FF2B5EF4-FFF2-40B4-BE49-F238E27FC236}">
+                <a16:creationId xmlns:a16="http://schemas.microsoft.com/office/drawing/2014/main" id="{F62E801A-2DC1-4FCF-8A19-E998D2D44A30}"/>
+              </a:ext>
+            </a:extLst>
+          </p:cNvPr>
+          <p:cNvSpPr>
+            <a:spLocks noGrp="1"/>
+          </p:cNvSpPr>
+          <p:nvPr>
+            <p:ph type="title"/>
+          </p:nvPr>
+        </p:nvSpPr>
+        <p:spPr>
+          <a:xfrm>
+            <a:off x="305267" y="18255"/>
+            <a:ext cx="10515600" cy="1325563"/>
+          </a:xfrm>
+        </p:spPr>
+        <p:txBody>
+          <a:bodyPr>
+            <a:normAutofit/>
+          </a:bodyPr>
+          <a:lstStyle/>
+          <a:p>
+            <a:r>
+              <a:rPr lang="en-US" dirty="0">
+                <a:solidFill>
+                  <a:schemeClr val="bg1"/>
+                </a:solidFill>
+              </a:rPr>
+              <a:t>Exploring The Data</a:t>
+            </a:r>
+          </a:p>
+        </p:txBody>
+      </p:sp>
+      <p:pic>
+        <p:nvPicPr>
+          <p:cNvPr id="8" name="Picture 7">
+            <a:extLst>
+              <a:ext uri="{FF2B5EF4-FFF2-40B4-BE49-F238E27FC236}">
+                <a16:creationId xmlns:a16="http://schemas.microsoft.com/office/drawing/2014/main" id="{3C35FEE8-163F-493D-8671-9AB360ED2544}"/>
+              </a:ext>
+            </a:extLst>
+          </p:cNvPr>
+          <p:cNvPicPr>
+            <a:picLocks noChangeAspect="1"/>
+          </p:cNvPicPr>
+          <p:nvPr/>
+        </p:nvPicPr>
+        <p:blipFill>
+          <a:blip r:embed="rId2"/>
+          <a:stretch>
+            <a:fillRect/>
+          </a:stretch>
+        </p:blipFill>
+        <p:spPr>
+          <a:xfrm>
+            <a:off x="8298641" y="4052115"/>
+            <a:ext cx="1743075" cy="2609850"/>
+          </a:xfrm>
+          <a:prstGeom prst="rect">
+            <a:avLst/>
+          </a:prstGeom>
+        </p:spPr>
+      </p:pic>
+      <p:sp>
+        <p:nvSpPr>
+          <p:cNvPr id="9" name="Title 1">
+            <a:extLst>
+              <a:ext uri="{FF2B5EF4-FFF2-40B4-BE49-F238E27FC236}">
+                <a16:creationId xmlns:a16="http://schemas.microsoft.com/office/drawing/2014/main" id="{CCCFA817-377B-456A-8190-6C7AEDBC176E}"/>
+              </a:ext>
+            </a:extLst>
+          </p:cNvPr>
+          <p:cNvSpPr txBox="1">
+            <a:spLocks/>
+          </p:cNvSpPr>
+          <p:nvPr/>
+        </p:nvSpPr>
+        <p:spPr>
+          <a:xfrm>
+            <a:off x="8507519" y="3325595"/>
+            <a:ext cx="1325318" cy="998109"/>
+          </a:xfrm>
+          <a:prstGeom prst="rect">
+            <a:avLst/>
+          </a:prstGeom>
+        </p:spPr>
+        <p:txBody>
+          <a:bodyPr vert="horz" lIns="91440" tIns="45720" rIns="91440" bIns="45720" rtlCol="0" anchor="ctr">
+            <a:normAutofit/>
+          </a:bodyPr>
+          <a:lstStyle>
+            <a:lvl1pPr algn="l" defTabSz="914400" rtl="0" eaLnBrk="1" latinLnBrk="0" hangingPunct="1">
+              <a:lnSpc>
+                <a:spcPct val="90000"/>
+              </a:lnSpc>
+              <a:spcBef>
+                <a:spcPct val="0"/>
+              </a:spcBef>
+              <a:buNone/>
+              <a:defRPr sz="4400" kern="1200">
+                <a:solidFill>
+                  <a:schemeClr val="tx1"/>
+                </a:solidFill>
+                <a:latin typeface="+mj-lt"/>
+                <a:ea typeface="+mj-ea"/>
+                <a:cs typeface="+mj-cs"/>
+              </a:defRPr>
+            </a:lvl1pPr>
+          </a:lstStyle>
+          <a:p>
+            <a:r>
+              <a:rPr lang="en-US" sz="2000" dirty="0"/>
+              <a:t>Null Values</a:t>
+            </a:r>
+          </a:p>
+        </p:txBody>
+      </p:sp>
+      <p:pic>
+        <p:nvPicPr>
+          <p:cNvPr id="12" name="Picture 11">
+            <a:extLst>
+              <a:ext uri="{FF2B5EF4-FFF2-40B4-BE49-F238E27FC236}">
+                <a16:creationId xmlns:a16="http://schemas.microsoft.com/office/drawing/2014/main" id="{5499E8A9-AC42-4E97-A548-00A6BAC47D0F}"/>
+              </a:ext>
+            </a:extLst>
+          </p:cNvPr>
+          <p:cNvPicPr>
+            <a:picLocks noChangeAspect="1"/>
+          </p:cNvPicPr>
+          <p:nvPr/>
+        </p:nvPicPr>
+        <p:blipFill>
+          <a:blip r:embed="rId3"/>
+          <a:stretch>
+            <a:fillRect/>
+          </a:stretch>
+        </p:blipFill>
+        <p:spPr>
+          <a:xfrm>
+            <a:off x="189770" y="1217235"/>
+            <a:ext cx="3389293" cy="2839127"/>
+          </a:xfrm>
+          <a:prstGeom prst="rect">
+            <a:avLst/>
+          </a:prstGeom>
+          <a:ln w="9525">
+            <a:solidFill>
+              <a:schemeClr val="accent1">
+                <a:lumMod val="60000"/>
+                <a:lumOff val="40000"/>
+              </a:schemeClr>
+            </a:solidFill>
+          </a:ln>
+        </p:spPr>
+      </p:pic>
+      <p:sp>
+        <p:nvSpPr>
+          <p:cNvPr id="14" name="TextBox 13">
+            <a:extLst>
+              <a:ext uri="{FF2B5EF4-FFF2-40B4-BE49-F238E27FC236}">
+                <a16:creationId xmlns:a16="http://schemas.microsoft.com/office/drawing/2014/main" id="{818C94FA-E776-423A-86FE-714E34EAD2D1}"/>
+              </a:ext>
+            </a:extLst>
+          </p:cNvPr>
+          <p:cNvSpPr txBox="1"/>
+          <p:nvPr/>
+        </p:nvSpPr>
+        <p:spPr>
+          <a:xfrm>
+            <a:off x="272906" y="5172374"/>
+            <a:ext cx="3306157" cy="369332"/>
+          </a:xfrm>
+          <a:prstGeom prst="rect">
+            <a:avLst/>
+          </a:prstGeom>
+          <a:noFill/>
+        </p:spPr>
+        <p:txBody>
+          <a:bodyPr wrap="square">
+            <a:spAutoFit/>
+          </a:bodyPr>
+          <a:lstStyle/>
+          <a:p>
+            <a:r>
+              <a:rPr lang="en-US" dirty="0"/>
+              <a:t>Natural Log to normalize the data</a:t>
+            </a:r>
+          </a:p>
+        </p:txBody>
+      </p:sp>
+      <p:pic>
+        <p:nvPicPr>
+          <p:cNvPr id="16" name="Picture 15">
+            <a:extLst>
+              <a:ext uri="{FF2B5EF4-FFF2-40B4-BE49-F238E27FC236}">
+                <a16:creationId xmlns:a16="http://schemas.microsoft.com/office/drawing/2014/main" id="{1455A19A-CC32-4ABF-ADEF-ACEBCC3BC92E}"/>
+              </a:ext>
+            </a:extLst>
+          </p:cNvPr>
+          <p:cNvPicPr>
+            <a:picLocks noChangeAspect="1"/>
+          </p:cNvPicPr>
+          <p:nvPr/>
+        </p:nvPicPr>
+        <p:blipFill>
+          <a:blip r:embed="rId4"/>
+          <a:stretch>
+            <a:fillRect/>
+          </a:stretch>
+        </p:blipFill>
+        <p:spPr>
+          <a:xfrm>
+            <a:off x="4054934" y="2636798"/>
+            <a:ext cx="3389293" cy="2906094"/>
+          </a:xfrm>
+          <a:prstGeom prst="rect">
+            <a:avLst/>
+          </a:prstGeom>
+          <a:ln>
+            <a:solidFill>
+              <a:schemeClr val="accent1">
+                <a:lumMod val="60000"/>
+                <a:lumOff val="40000"/>
+              </a:schemeClr>
+            </a:solidFill>
+          </a:ln>
+        </p:spPr>
+      </p:pic>
+      <p:sp>
+        <p:nvSpPr>
+          <p:cNvPr id="17" name="Arrow: Bent-Up 16">
+            <a:extLst>
+              <a:ext uri="{FF2B5EF4-FFF2-40B4-BE49-F238E27FC236}">
+                <a16:creationId xmlns:a16="http://schemas.microsoft.com/office/drawing/2014/main" id="{D360231A-B509-4BD1-B997-EB37C3E384E7}"/>
+              </a:ext>
+            </a:extLst>
+          </p:cNvPr>
+          <p:cNvSpPr/>
+          <p:nvPr/>
+        </p:nvSpPr>
+        <p:spPr>
+          <a:xfrm rot="5400000">
+            <a:off x="1722214" y="3806201"/>
+            <a:ext cx="852692" cy="1655851"/>
+          </a:xfrm>
+          <a:prstGeom prst="bentUpArrow">
+            <a:avLst>
+              <a:gd name="adj1" fmla="val 25000"/>
+              <a:gd name="adj2" fmla="val 27398"/>
+              <a:gd name="adj3" fmla="val 25000"/>
+            </a:avLst>
+          </a:prstGeom>
+        </p:spPr>
+        <p:style>
+          <a:lnRef idx="2">
+            <a:schemeClr val="accent1">
+              <a:shade val="50000"/>
+            </a:schemeClr>
+          </a:lnRef>
+          <a:fillRef idx="1">
+            <a:schemeClr val="accent1"/>
+          </a:fillRef>
+          <a:effectRef idx="0">
+            <a:schemeClr val="accent1"/>
+          </a:effectRef>
+          <a:fontRef idx="minor">
+            <a:schemeClr val="lt1"/>
+          </a:fontRef>
+        </p:style>
+        <p:txBody>
+          <a:bodyPr rtlCol="0" anchor="ctr"/>
+          <a:lstStyle/>
+          <a:p>
+            <a:pPr algn="ctr"/>
+            <a:endParaRPr lang="en-US"/>
+          </a:p>
+        </p:txBody>
+      </p:sp>
+      <p:sp>
+        <p:nvSpPr>
+          <p:cNvPr id="19" name="Arrow: Bent-Up 18">
+            <a:extLst>
+              <a:ext uri="{FF2B5EF4-FFF2-40B4-BE49-F238E27FC236}">
+                <a16:creationId xmlns:a16="http://schemas.microsoft.com/office/drawing/2014/main" id="{6E84212A-2B63-46A5-BC3F-D2F2483A5566}"/>
+              </a:ext>
+            </a:extLst>
+          </p:cNvPr>
+          <p:cNvSpPr/>
+          <p:nvPr/>
+        </p:nvSpPr>
+        <p:spPr>
+          <a:xfrm rot="5400000">
+            <a:off x="6233444" y="5187151"/>
+            <a:ext cx="852692" cy="1655851"/>
+          </a:xfrm>
+          <a:prstGeom prst="bentUpArrow">
+            <a:avLst>
+              <a:gd name="adj1" fmla="val 25000"/>
+              <a:gd name="adj2" fmla="val 27398"/>
+              <a:gd name="adj3" fmla="val 25000"/>
+            </a:avLst>
+          </a:prstGeom>
+        </p:spPr>
+        <p:style>
+          <a:lnRef idx="2">
+            <a:schemeClr val="accent1">
+              <a:shade val="50000"/>
+            </a:schemeClr>
+          </a:lnRef>
+          <a:fillRef idx="1">
+            <a:schemeClr val="accent1"/>
+          </a:fillRef>
+          <a:effectRef idx="0">
+            <a:schemeClr val="accent1"/>
+          </a:effectRef>
+          <a:fontRef idx="minor">
+            <a:schemeClr val="lt1"/>
+          </a:fontRef>
+        </p:style>
+        <p:txBody>
+          <a:bodyPr rtlCol="0" anchor="ctr"/>
+          <a:lstStyle/>
+          <a:p>
+            <a:pPr algn="ctr"/>
+            <a:endParaRPr lang="en-US" dirty="0"/>
+          </a:p>
+        </p:txBody>
+      </p:sp>
+      <p:sp>
+        <p:nvSpPr>
+          <p:cNvPr id="20" name="Arrow: Right 19">
+            <a:extLst>
+              <a:ext uri="{FF2B5EF4-FFF2-40B4-BE49-F238E27FC236}">
+                <a16:creationId xmlns:a16="http://schemas.microsoft.com/office/drawing/2014/main" id="{83492A7F-A842-460E-A501-54892C7B98F1}"/>
+              </a:ext>
+            </a:extLst>
+          </p:cNvPr>
+          <p:cNvSpPr/>
+          <p:nvPr/>
+        </p:nvSpPr>
+        <p:spPr>
+          <a:xfrm>
+            <a:off x="10041716" y="5886508"/>
+            <a:ext cx="263661" cy="369332"/>
+          </a:xfrm>
+          <a:prstGeom prst="rightArrow">
+            <a:avLst/>
+          </a:prstGeom>
+        </p:spPr>
+        <p:style>
+          <a:lnRef idx="2">
+            <a:schemeClr val="accent1">
+              <a:shade val="50000"/>
+            </a:schemeClr>
+          </a:lnRef>
+          <a:fillRef idx="1">
+            <a:schemeClr val="accent1"/>
+          </a:fillRef>
+          <a:effectRef idx="0">
+            <a:schemeClr val="accent1"/>
+          </a:effectRef>
+          <a:fontRef idx="minor">
+            <a:schemeClr val="lt1"/>
+          </a:fontRef>
+        </p:style>
+        <p:txBody>
+          <a:bodyPr rtlCol="0" anchor="ctr"/>
+          <a:lstStyle/>
+          <a:p>
+            <a:pPr algn="ctr"/>
+            <a:endParaRPr lang="en-US"/>
+          </a:p>
+        </p:txBody>
+      </p:sp>
+      <p:sp>
+        <p:nvSpPr>
+          <p:cNvPr id="21" name="TextBox 20">
+            <a:extLst>
+              <a:ext uri="{FF2B5EF4-FFF2-40B4-BE49-F238E27FC236}">
+                <a16:creationId xmlns:a16="http://schemas.microsoft.com/office/drawing/2014/main" id="{579087E1-CBD1-4BCA-8DD5-B7E9DBBC51FD}"/>
+              </a:ext>
+            </a:extLst>
+          </p:cNvPr>
+          <p:cNvSpPr txBox="1"/>
+          <p:nvPr/>
+        </p:nvSpPr>
+        <p:spPr>
+          <a:xfrm>
+            <a:off x="10512795" y="5748008"/>
+            <a:ext cx="1834410" cy="646331"/>
+          </a:xfrm>
+          <a:prstGeom prst="rect">
+            <a:avLst/>
+          </a:prstGeom>
+          <a:noFill/>
+        </p:spPr>
+        <p:txBody>
+          <a:bodyPr wrap="square" rtlCol="0">
+            <a:spAutoFit/>
+          </a:bodyPr>
+          <a:lstStyle/>
+          <a:p>
+            <a:r>
+              <a:rPr lang="en-US" dirty="0"/>
+              <a:t>All null values reduced to 0</a:t>
+            </a:r>
+          </a:p>
+        </p:txBody>
+      </p:sp>
+    </p:spTree>
+    <p:extLst>
+      <p:ext uri="{BB962C8B-B14F-4D97-AF65-F5344CB8AC3E}">
+        <p14:creationId xmlns:p14="http://schemas.microsoft.com/office/powerpoint/2010/main" val="2268026075"/>
       </p:ext>
     </p:extLst>
   </p:cSld>
@@ -13056,7 +14567,7 @@
             <p:ph idx="1"/>
             <p:extLst>
               <p:ext uri="{D42A27DB-BD31-4B8C-83A1-F6EECF244321}">
-                <p14:modId xmlns:p14="http://schemas.microsoft.com/office/powerpoint/2010/main" val="176451821"/>
+                <p14:modId xmlns:p14="http://schemas.microsoft.com/office/powerpoint/2010/main" val="4291853053"/>
               </p:ext>
             </p:extLst>
           </p:nvPr>
@@ -13071,6 +14582,86 @@
           </a:graphicData>
         </a:graphic>
       </p:graphicFrame>
+      <p:sp>
+        <p:nvSpPr>
+          <p:cNvPr id="3" name="TextBox 2">
+            <a:extLst>
+              <a:ext uri="{FF2B5EF4-FFF2-40B4-BE49-F238E27FC236}">
+                <a16:creationId xmlns:a16="http://schemas.microsoft.com/office/drawing/2014/main" id="{9FC14FFD-19C6-4A78-AA99-5A9669BCE9D4}"/>
+              </a:ext>
+            </a:extLst>
+          </p:cNvPr>
+          <p:cNvSpPr txBox="1"/>
+          <p:nvPr/>
+        </p:nvSpPr>
+        <p:spPr>
+          <a:xfrm>
+            <a:off x="768545" y="5318106"/>
+            <a:ext cx="2659053" cy="1292662"/>
+          </a:xfrm>
+          <a:prstGeom prst="rect">
+            <a:avLst/>
+          </a:prstGeom>
+          <a:noFill/>
+        </p:spPr>
+        <p:txBody>
+          <a:bodyPr wrap="square" rtlCol="0">
+            <a:spAutoFit/>
+          </a:bodyPr>
+          <a:lstStyle/>
+          <a:p>
+            <a:pPr marL="285750" indent="-285750">
+              <a:buFont typeface="Arial" panose="020B0604020202020204" pitchFamily="34" charset="0"/>
+              <a:buChar char="•"/>
+            </a:pPr>
+            <a:r>
+              <a:rPr lang="en-US" sz="1200" dirty="0"/>
+              <a:t>Real Estate Agents</a:t>
+            </a:r>
+          </a:p>
+          <a:p>
+            <a:pPr marL="285750" indent="-285750">
+              <a:buFont typeface="Arial" panose="020B0604020202020204" pitchFamily="34" charset="0"/>
+              <a:buChar char="•"/>
+            </a:pPr>
+            <a:r>
+              <a:rPr lang="en-US" sz="1200" dirty="0"/>
+              <a:t>Houses in close proximity</a:t>
+            </a:r>
+          </a:p>
+          <a:p>
+            <a:pPr marL="285750" indent="-285750">
+              <a:buFont typeface="Arial" panose="020B0604020202020204" pitchFamily="34" charset="0"/>
+              <a:buChar char="•"/>
+            </a:pPr>
+            <a:r>
+              <a:rPr lang="en-US" sz="1200" dirty="0"/>
+              <a:t>Online information</a:t>
+            </a:r>
+          </a:p>
+          <a:p>
+            <a:pPr marL="285750" indent="-285750">
+              <a:buFont typeface="Arial" panose="020B0604020202020204" pitchFamily="34" charset="0"/>
+              <a:buChar char="•"/>
+            </a:pPr>
+            <a:endParaRPr lang="en-US" sz="1400" dirty="0"/>
+          </a:p>
+          <a:p>
+            <a:pPr marL="285750" indent="-285750">
+              <a:buFont typeface="Arial" panose="020B0604020202020204" pitchFamily="34" charset="0"/>
+              <a:buChar char="•"/>
+            </a:pPr>
+            <a:endParaRPr lang="en-US" sz="1400" dirty="0"/>
+          </a:p>
+          <a:p>
+            <a:pPr marL="285750" indent="-285750">
+              <a:buFont typeface="Arial" panose="020B0604020202020204" pitchFamily="34" charset="0"/>
+              <a:buChar char="•"/>
+            </a:pPr>
+            <a:endParaRPr lang="en-US" sz="1400" dirty="0"/>
+          </a:p>
+        </p:txBody>
+      </p:sp>
     </p:spTree>
     <p:extLst>
       <p:ext uri="{BB962C8B-B14F-4D97-AF65-F5344CB8AC3E}">
@@ -13206,7 +14797,7 @@
                   <a:schemeClr val="bg1"/>
                 </a:solidFill>
               </a:rPr>
-              <a:t>Current State</a:t>
+              <a:t>The Data</a:t>
             </a:r>
           </a:p>
         </p:txBody>
@@ -13239,46 +14830,49 @@
           <a:p>
             <a:r>
               <a:rPr lang="en-US" dirty="0"/>
-              <a:t>People rely on the following for information for guidance:</a:t>
+              <a:t>Kaggle </a:t>
             </a:r>
-          </a:p>
-          <a:p>
-            <a:pPr lvl="1">
-              <a:lnSpc>
-                <a:spcPct val="150000"/>
-              </a:lnSpc>
-              <a:buFont typeface="Wingdings" panose="05000000000000000000" pitchFamily="2" charset="2"/>
-              <a:buChar char="Ø"/>
-            </a:pPr>
+            <a:r>
+              <a:rPr lang="en-US" dirty="0" err="1"/>
+              <a:t>DataSet</a:t>
+            </a:r>
             <a:r>
               <a:rPr lang="en-US" dirty="0"/>
-              <a:t>Real Estate Agents- Might not have your best interest in mind</a:t>
+              <a:t>(</a:t>
             </a:r>
-          </a:p>
-          <a:p>
-            <a:pPr lvl="1">
-              <a:lnSpc>
-                <a:spcPct val="150000"/>
-              </a:lnSpc>
-              <a:buFont typeface="Wingdings" panose="05000000000000000000" pitchFamily="2" charset="2"/>
-              <a:buChar char="Ø"/>
-            </a:pPr>
+            <a:r>
+              <a:rPr lang="en-US" dirty="0">
+                <a:hlinkClick r:id="rId2"/>
+              </a:rPr>
+              <a:t>https://www.kaggle.com/c/house-prices-advanced-regression-techniques/data</a:t>
+            </a:r>
             <a:r>
               <a:rPr lang="en-US" dirty="0"/>
-              <a:t>Homes In Close Proximity- This will have some effect, but might not be the difference making factor</a:t>
+              <a:t>) </a:t>
             </a:r>
           </a:p>
           <a:p>
-            <a:pPr lvl="1">
-              <a:lnSpc>
-                <a:spcPct val="150000"/>
-              </a:lnSpc>
-              <a:buFont typeface="Wingdings" panose="05000000000000000000" pitchFamily="2" charset="2"/>
-              <a:buChar char="Ø"/>
-            </a:pPr>
             <a:r>
               <a:rPr lang="en-US" dirty="0"/>
-              <a:t>Information Online- Can sometime be misleading</a:t>
+              <a:t>1,460 homes in Ames, Iowa</a:t>
+            </a:r>
+          </a:p>
+          <a:p>
+            <a:r>
+              <a:rPr lang="en-US" dirty="0"/>
+              <a:t>81 explanatory variables for almost every home</a:t>
+            </a:r>
+          </a:p>
+          <a:p>
+            <a:r>
+              <a:rPr lang="en-US" dirty="0"/>
+              <a:t>Categorical and numerical data features</a:t>
+            </a:r>
+          </a:p>
+          <a:p>
+            <a:r>
+              <a:rPr lang="en-US" dirty="0"/>
+              <a:t>6,965 null values</a:t>
             </a:r>
           </a:p>
         </p:txBody>
@@ -13286,7 +14880,7 @@
     </p:spTree>
     <p:extLst>
       <p:ext uri="{BB962C8B-B14F-4D97-AF65-F5344CB8AC3E}">
-        <p14:creationId xmlns:p14="http://schemas.microsoft.com/office/powerpoint/2010/main" val="2131613205"/>
+        <p14:creationId xmlns:p14="http://schemas.microsoft.com/office/powerpoint/2010/main" val="1721869438"/>
       </p:ext>
     </p:extLst>
   </p:cSld>
@@ -13297,253 +14891,6 @@
 </file>
 
 <file path=ppt/slides/slide4.xml><?xml version="1.0" encoding="utf-8"?>
-<p:sld xmlns:a="http://schemas.openxmlformats.org/drawingml/2006/main" xmlns:r="http://schemas.openxmlformats.org/officeDocument/2006/relationships" xmlns:p="http://schemas.openxmlformats.org/presentationml/2006/main">
-  <p:cSld>
-    <p:bg>
-      <p:bgPr>
-        <a:solidFill>
-          <a:schemeClr val="bg1"/>
-        </a:solidFill>
-        <a:effectLst/>
-      </p:bgPr>
-    </p:bg>
-    <p:spTree>
-      <p:nvGrpSpPr>
-        <p:cNvPr id="1" name=""/>
-        <p:cNvGrpSpPr/>
-        <p:nvPr/>
-      </p:nvGrpSpPr>
-      <p:grpSpPr>
-        <a:xfrm>
-          <a:off x="0" y="0"/>
-          <a:ext cx="0" cy="0"/>
-          <a:chOff x="0" y="0"/>
-          <a:chExt cx="0" cy="0"/>
-        </a:xfrm>
-      </p:grpSpPr>
-      <p:sp>
-        <p:nvSpPr>
-          <p:cNvPr id="10" name="Rectangle 9">
-            <a:extLst>
-              <a:ext uri="{FF2B5EF4-FFF2-40B4-BE49-F238E27FC236}">
-                <a16:creationId xmlns:a16="http://schemas.microsoft.com/office/drawing/2014/main" id="{07E773EB-1EC1-4E49-9DE2-E6F460497242}"/>
-              </a:ext>
-              <a:ext uri="{C183D7F6-B498-43B3-948B-1728B52AA6E4}">
-                <adec:decorative xmlns:adec="http://schemas.microsoft.com/office/drawing/2017/decorative" val="1"/>
-              </a:ext>
-            </a:extLst>
-          </p:cNvPr>
-          <p:cNvSpPr>
-            <a:spLocks noGrp="1" noRot="1" noChangeAspect="1" noMove="1" noResize="1" noEditPoints="1" noAdjustHandles="1" noChangeArrowheads="1" noChangeShapeType="1" noTextEdit="1"/>
-          </p:cNvSpPr>
-          <p:nvPr>
-            <p:extLst>
-              <p:ext uri="{386F3935-93C4-4BCD-93E2-E3B085C9AB24}">
-                <p16:designElem xmlns:p16="http://schemas.microsoft.com/office/powerpoint/2015/main" val="1"/>
-              </p:ext>
-            </p:extLst>
-          </p:nvPr>
-        </p:nvSpPr>
-        <p:spPr>
-          <a:xfrm>
-            <a:off x="0" y="-10391"/>
-            <a:ext cx="12192000" cy="1943099"/>
-          </a:xfrm>
-          <a:prstGeom prst="rect">
-            <a:avLst/>
-          </a:prstGeom>
-          <a:solidFill>
-            <a:schemeClr val="accent1"/>
-          </a:solidFill>
-          <a:ln>
-            <a:noFill/>
-          </a:ln>
-        </p:spPr>
-        <p:style>
-          <a:lnRef idx="2">
-            <a:schemeClr val="accent1">
-              <a:shade val="50000"/>
-            </a:schemeClr>
-          </a:lnRef>
-          <a:fillRef idx="1">
-            <a:schemeClr val="accent1"/>
-          </a:fillRef>
-          <a:effectRef idx="0">
-            <a:schemeClr val="accent1"/>
-          </a:effectRef>
-          <a:fontRef idx="minor">
-            <a:schemeClr val="lt1"/>
-          </a:fontRef>
-        </p:style>
-        <p:txBody>
-          <a:bodyPr rtlCol="0" anchor="ctr"/>
-          <a:lstStyle/>
-          <a:p>
-            <a:pPr algn="ctr"/>
-            <a:endParaRPr lang="en-US" dirty="0"/>
-          </a:p>
-        </p:txBody>
-      </p:sp>
-      <p:sp>
-        <p:nvSpPr>
-          <p:cNvPr id="2" name="Title 1">
-            <a:extLst>
-              <a:ext uri="{FF2B5EF4-FFF2-40B4-BE49-F238E27FC236}">
-                <a16:creationId xmlns:a16="http://schemas.microsoft.com/office/drawing/2014/main" id="{5DDF07D5-A6A7-4D59-B181-D9EF8A1B6421}"/>
-              </a:ext>
-            </a:extLst>
-          </p:cNvPr>
-          <p:cNvSpPr>
-            <a:spLocks noGrp="1"/>
-          </p:cNvSpPr>
-          <p:nvPr>
-            <p:ph type="title"/>
-          </p:nvPr>
-        </p:nvSpPr>
-        <p:spPr>
-          <a:xfrm>
-            <a:off x="391378" y="320675"/>
-            <a:ext cx="11407487" cy="1325563"/>
-          </a:xfrm>
-        </p:spPr>
-        <p:txBody>
-          <a:bodyPr>
-            <a:normAutofit/>
-          </a:bodyPr>
-          <a:lstStyle/>
-          <a:p>
-            <a:r>
-              <a:rPr lang="en-US" sz="5400" dirty="0">
-                <a:solidFill>
-                  <a:schemeClr val="bg1"/>
-                </a:solidFill>
-              </a:rPr>
-              <a:t>Home Equity</a:t>
-            </a:r>
-          </a:p>
-        </p:txBody>
-      </p:sp>
-      <p:sp>
-        <p:nvSpPr>
-          <p:cNvPr id="6" name="Content Placeholder 5">
-            <a:extLst>
-              <a:ext uri="{FF2B5EF4-FFF2-40B4-BE49-F238E27FC236}">
-                <a16:creationId xmlns:a16="http://schemas.microsoft.com/office/drawing/2014/main" id="{26F718AD-E933-43C0-BD2B-135BF343B637}"/>
-              </a:ext>
-            </a:extLst>
-          </p:cNvPr>
-          <p:cNvSpPr>
-            <a:spLocks noGrp="1"/>
-          </p:cNvSpPr>
-          <p:nvPr>
-            <p:ph idx="1"/>
-          </p:nvPr>
-        </p:nvSpPr>
-        <p:spPr>
-          <a:xfrm>
-            <a:off x="391378" y="2145384"/>
-            <a:ext cx="10515600" cy="4351338"/>
-          </a:xfrm>
-        </p:spPr>
-        <p:txBody>
-          <a:bodyPr/>
-          <a:lstStyle/>
-          <a:p>
-            <a:r>
-              <a:rPr lang="en-US" dirty="0"/>
-              <a:t>“The difference between how much you owe on your mortgage and the market price or value of your home”</a:t>
-            </a:r>
-            <a:r>
-              <a:rPr lang="en-US" sz="1600" dirty="0"/>
-              <a:t>- </a:t>
-            </a:r>
-            <a:r>
-              <a:rPr lang="en-US" sz="1200" dirty="0"/>
-              <a:t>JIM PROBASCO</a:t>
-            </a:r>
-          </a:p>
-          <a:p>
-            <a:pPr marL="0" indent="0">
-              <a:buNone/>
-            </a:pPr>
-            <a:endParaRPr lang="en-US" sz="1200" dirty="0"/>
-          </a:p>
-          <a:p>
-            <a:r>
-              <a:rPr lang="en-US" dirty="0"/>
-              <a:t>Being able to find a home that is underpriced can help to improve the rate at which you are able to build equity</a:t>
-            </a:r>
-          </a:p>
-          <a:p>
-            <a:r>
-              <a:rPr lang="en-US" dirty="0">
-                <a:solidFill>
-                  <a:srgbClr val="C00000"/>
-                </a:solidFill>
-              </a:rPr>
-              <a:t>Minimum Performance Measure Needed, How to measure performance</a:t>
-            </a:r>
-          </a:p>
-          <a:p>
-            <a:endParaRPr lang="en-US" dirty="0"/>
-          </a:p>
-        </p:txBody>
-      </p:sp>
-      <p:sp>
-        <p:nvSpPr>
-          <p:cNvPr id="7" name="TextBox 6">
-            <a:extLst>
-              <a:ext uri="{FF2B5EF4-FFF2-40B4-BE49-F238E27FC236}">
-                <a16:creationId xmlns:a16="http://schemas.microsoft.com/office/drawing/2014/main" id="{D5C67421-AC1A-4DCF-96C7-4F0907097998}"/>
-              </a:ext>
-            </a:extLst>
-          </p:cNvPr>
-          <p:cNvSpPr txBox="1"/>
-          <p:nvPr/>
-        </p:nvSpPr>
-        <p:spPr>
-          <a:xfrm>
-            <a:off x="1533350" y="6488668"/>
-            <a:ext cx="10658650" cy="369332"/>
-          </a:xfrm>
-          <a:prstGeom prst="rect">
-            <a:avLst/>
-          </a:prstGeom>
-          <a:noFill/>
-        </p:spPr>
-        <p:txBody>
-          <a:bodyPr wrap="square" rtlCol="0">
-            <a:spAutoFit/>
-          </a:bodyPr>
-          <a:lstStyle/>
-          <a:p>
-            <a:r>
-              <a:rPr lang="en-US" dirty="0">
-                <a:hlinkClick r:id="rId2"/>
-              </a:rPr>
-              <a:t>https://www.investopedia.com/articles/mortgages-real-estate/08/home-ownership.asp</a:t>
-            </a:r>
-            <a:r>
-              <a:rPr lang="en-US" dirty="0"/>
-              <a:t> </a:t>
-            </a:r>
-          </a:p>
-        </p:txBody>
-      </p:sp>
-    </p:spTree>
-    <p:extLst>
-      <p:ext uri="{BB962C8B-B14F-4D97-AF65-F5344CB8AC3E}">
-        <p14:creationId xmlns:p14="http://schemas.microsoft.com/office/powerpoint/2010/main" val="3754238954"/>
-      </p:ext>
-    </p:extLst>
-  </p:cSld>
-  <p:clrMapOvr>
-    <a:masterClrMapping/>
-  </p:clrMapOvr>
-</p:sld>
-</file>
-
-<file path=ppt/slides/slide5.xml><?xml version="1.0" encoding="utf-8"?>
 <p:sld xmlns:a="http://schemas.openxmlformats.org/drawingml/2006/main" xmlns:r="http://schemas.openxmlformats.org/officeDocument/2006/relationships" xmlns:p="http://schemas.openxmlformats.org/presentationml/2006/main">
   <p:cSld>
     <p:bg>
@@ -13647,7 +14994,7 @@
             <p:ph idx="1"/>
             <p:extLst>
               <p:ext uri="{D42A27DB-BD31-4B8C-83A1-F6EECF244321}">
-                <p14:modId xmlns:p14="http://schemas.microsoft.com/office/powerpoint/2010/main" val="2190283449"/>
+                <p14:modId xmlns:p14="http://schemas.microsoft.com/office/powerpoint/2010/main" val="91903064"/>
               </p:ext>
             </p:extLst>
           </p:nvPr>
@@ -13740,17 +15087,9 @@
 </p:sld>
 </file>
 
-<file path=ppt/slides/slide6.xml><?xml version="1.0" encoding="utf-8"?>
+<file path=ppt/slides/slide5.xml><?xml version="1.0" encoding="utf-8"?>
 <p:sld xmlns:a="http://schemas.openxmlformats.org/drawingml/2006/main" xmlns:r="http://schemas.openxmlformats.org/officeDocument/2006/relationships" xmlns:p="http://schemas.openxmlformats.org/presentationml/2006/main">
   <p:cSld>
-    <p:bg>
-      <p:bgPr>
-        <a:solidFill>
-          <a:schemeClr val="bg1"/>
-        </a:solidFill>
-        <a:effectLst/>
-      </p:bgPr>
-    </p:bg>
     <p:spTree>
       <p:nvGrpSpPr>
         <p:cNvPr id="1" name=""/>
@@ -13767,41 +15106,24 @@
       </p:grpSpPr>
       <p:sp>
         <p:nvSpPr>
-          <p:cNvPr id="10" name="Rectangle 9">
+          <p:cNvPr id="4" name="Rectangle 3">
             <a:extLst>
               <a:ext uri="{FF2B5EF4-FFF2-40B4-BE49-F238E27FC236}">
-                <a16:creationId xmlns:a16="http://schemas.microsoft.com/office/drawing/2014/main" id="{07E773EB-1EC1-4E49-9DE2-E6F460497242}"/>
-              </a:ext>
-              <a:ext uri="{C183D7F6-B498-43B3-948B-1728B52AA6E4}">
-                <adec:decorative xmlns:adec="http://schemas.microsoft.com/office/drawing/2017/decorative" val="1"/>
+                <a16:creationId xmlns:a16="http://schemas.microsoft.com/office/drawing/2014/main" id="{336DBEF0-7328-48E9-BF82-299017D4364D}"/>
               </a:ext>
             </a:extLst>
           </p:cNvPr>
-          <p:cNvSpPr>
-            <a:spLocks noGrp="1" noRot="1" noChangeAspect="1" noMove="1" noResize="1" noEditPoints="1" noAdjustHandles="1" noChangeArrowheads="1" noChangeShapeType="1" noTextEdit="1"/>
-          </p:cNvSpPr>
-          <p:nvPr>
-            <p:extLst>
-              <p:ext uri="{386F3935-93C4-4BCD-93E2-E3B085C9AB24}">
-                <p16:designElem xmlns:p16="http://schemas.microsoft.com/office/powerpoint/2015/main" val="1"/>
-              </p:ext>
-            </p:extLst>
-          </p:nvPr>
+          <p:cNvSpPr/>
+          <p:nvPr/>
         </p:nvSpPr>
         <p:spPr>
           <a:xfrm>
-            <a:off x="0" y="-10391"/>
-            <a:ext cx="12192000" cy="1943099"/>
+            <a:off x="-44879" y="0"/>
+            <a:ext cx="12192000" cy="1116353"/>
           </a:xfrm>
           <a:prstGeom prst="rect">
             <a:avLst/>
           </a:prstGeom>
-          <a:solidFill>
-            <a:schemeClr val="accent1"/>
-          </a:solidFill>
-          <a:ln>
-            <a:noFill/>
-          </a:ln>
         </p:spPr>
         <p:style>
           <a:lnRef idx="2">
@@ -13824,7 +15146,7 @@
           <a:lstStyle/>
           <a:p>
             <a:pPr algn="ctr"/>
-            <a:endParaRPr lang="en-US" dirty="0"/>
+            <a:endParaRPr lang="en-US"/>
           </a:p>
         </p:txBody>
       </p:sp>
@@ -13833,7 +15155,7 @@
           <p:cNvPr id="2" name="Title 1">
             <a:extLst>
               <a:ext uri="{FF2B5EF4-FFF2-40B4-BE49-F238E27FC236}">
-                <a16:creationId xmlns:a16="http://schemas.microsoft.com/office/drawing/2014/main" id="{5DDF07D5-A6A7-4D59-B181-D9EF8A1B6421}"/>
+                <a16:creationId xmlns:a16="http://schemas.microsoft.com/office/drawing/2014/main" id="{F62E801A-2DC1-4FCF-8A19-E998D2D44A30}"/>
               </a:ext>
             </a:extLst>
           </p:cNvPr>
@@ -13846,8 +15168,8 @@
         </p:nvSpPr>
         <p:spPr>
           <a:xfrm>
-            <a:off x="391378" y="320675"/>
-            <a:ext cx="11407487" cy="1325563"/>
+            <a:off x="305267" y="18255"/>
+            <a:ext cx="10515600" cy="1325563"/>
           </a:xfrm>
         </p:spPr>
         <p:txBody>
@@ -13857,22 +15179,322 @@
           <a:lstStyle/>
           <a:p>
             <a:r>
-              <a:rPr lang="en-US" sz="5400" dirty="0">
+              <a:rPr lang="en-US" dirty="0">
                 <a:solidFill>
                   <a:schemeClr val="bg1"/>
                 </a:solidFill>
               </a:rPr>
-              <a:t>The Data</a:t>
+              <a:t>Simple Model</a:t>
             </a:r>
+          </a:p>
+        </p:txBody>
+      </p:sp>
+      <p:pic>
+        <p:nvPicPr>
+          <p:cNvPr id="5" name="Picture 4" descr="A picture containing person&#10;&#10;Description automatically generated">
+            <a:extLst>
+              <a:ext uri="{FF2B5EF4-FFF2-40B4-BE49-F238E27FC236}">
+                <a16:creationId xmlns:a16="http://schemas.microsoft.com/office/drawing/2014/main" id="{322EDFCE-29B0-4726-BC3C-9C0212A1CB18}"/>
+              </a:ext>
+            </a:extLst>
+          </p:cNvPr>
+          <p:cNvPicPr>
+            <a:picLocks noChangeAspect="1"/>
+          </p:cNvPicPr>
+          <p:nvPr/>
+        </p:nvPicPr>
+        <p:blipFill>
+          <a:blip r:embed="rId2">
+            <a:extLst>
+              <a:ext uri="{28A0092B-C50C-407E-A947-70E740481C1C}">
+                <a14:useLocalDpi xmlns:a14="http://schemas.microsoft.com/office/drawing/2010/main" val="0"/>
+              </a:ext>
+            </a:extLst>
+          </a:blip>
+          <a:stretch>
+            <a:fillRect/>
+          </a:stretch>
+        </p:blipFill>
+        <p:spPr>
+          <a:xfrm>
+            <a:off x="305267" y="1752183"/>
+            <a:ext cx="5487650" cy="3658433"/>
+          </a:xfrm>
+          <a:prstGeom prst="rect">
+            <a:avLst/>
+          </a:prstGeom>
+        </p:spPr>
+      </p:pic>
+      <p:graphicFrame>
+        <p:nvGraphicFramePr>
+          <p:cNvPr id="7" name="Table 7">
+            <a:extLst>
+              <a:ext uri="{FF2B5EF4-FFF2-40B4-BE49-F238E27FC236}">
+                <a16:creationId xmlns:a16="http://schemas.microsoft.com/office/drawing/2014/main" id="{B8F21414-9CBD-4569-85B4-B9A4813B5589}"/>
+              </a:ext>
+            </a:extLst>
+          </p:cNvPr>
+          <p:cNvGraphicFramePr>
+            <a:graphicFrameLocks noGrp="1"/>
+          </p:cNvGraphicFramePr>
+          <p:nvPr/>
+        </p:nvGraphicFramePr>
+        <p:xfrm>
+          <a:off x="5463673" y="2693504"/>
+          <a:ext cx="6584056" cy="1470992"/>
+        </p:xfrm>
+        <a:graphic>
+          <a:graphicData uri="http://schemas.openxmlformats.org/drawingml/2006/table">
+            <a:tbl>
+              <a:tblPr firstRow="1" bandRow="1">
+                <a:tableStyleId>{5C22544A-7EE6-4342-B048-85BDC9FD1C3A}</a:tableStyleId>
+              </a:tblPr>
+              <a:tblGrid>
+                <a:gridCol w="1646014">
+                  <a:extLst>
+                    <a:ext uri="{9D8B030D-6E8A-4147-A177-3AD203B41FA5}">
+                      <a16:colId xmlns:a16="http://schemas.microsoft.com/office/drawing/2014/main" val="3602247973"/>
+                    </a:ext>
+                  </a:extLst>
+                </a:gridCol>
+                <a:gridCol w="1646014">
+                  <a:extLst>
+                    <a:ext uri="{9D8B030D-6E8A-4147-A177-3AD203B41FA5}">
+                      <a16:colId xmlns:a16="http://schemas.microsoft.com/office/drawing/2014/main" val="1451570357"/>
+                    </a:ext>
+                  </a:extLst>
+                </a:gridCol>
+                <a:gridCol w="1646014">
+                  <a:extLst>
+                    <a:ext uri="{9D8B030D-6E8A-4147-A177-3AD203B41FA5}">
+                      <a16:colId xmlns:a16="http://schemas.microsoft.com/office/drawing/2014/main" val="1353696101"/>
+                    </a:ext>
+                  </a:extLst>
+                </a:gridCol>
+                <a:gridCol w="1646014">
+                  <a:extLst>
+                    <a:ext uri="{9D8B030D-6E8A-4147-A177-3AD203B41FA5}">
+                      <a16:colId xmlns:a16="http://schemas.microsoft.com/office/drawing/2014/main" val="3371351900"/>
+                    </a:ext>
+                  </a:extLst>
+                </a:gridCol>
+              </a:tblGrid>
+              <a:tr h="735496">
+                <a:tc>
+                  <a:txBody>
+                    <a:bodyPr/>
+                    <a:lstStyle/>
+                    <a:p>
+                      <a:r>
+                        <a:rPr lang="en-US" dirty="0"/>
+                        <a:t>Model Type</a:t>
+                      </a:r>
+                    </a:p>
+                  </a:txBody>
+                  <a:tcPr/>
+                </a:tc>
+                <a:tc>
+                  <a:txBody>
+                    <a:bodyPr/>
+                    <a:lstStyle/>
+                    <a:p>
+                      <a:r>
+                        <a:rPr lang="en-US" dirty="0"/>
+                        <a:t>Training R</a:t>
+                      </a:r>
+                      <a:r>
+                        <a:rPr lang="en-US" baseline="30000" dirty="0"/>
+                        <a:t>2</a:t>
+                      </a:r>
+                    </a:p>
+                  </a:txBody>
+                  <a:tcPr/>
+                </a:tc>
+                <a:tc>
+                  <a:txBody>
+                    <a:bodyPr/>
+                    <a:lstStyle/>
+                    <a:p>
+                      <a:r>
+                        <a:rPr lang="en-US" dirty="0"/>
+                        <a:t>Testing R</a:t>
+                      </a:r>
+                      <a:r>
+                        <a:rPr lang="en-US" baseline="30000" dirty="0"/>
+                        <a:t>2</a:t>
+                      </a:r>
+                    </a:p>
+                  </a:txBody>
+                  <a:tcPr/>
+                </a:tc>
+                <a:tc>
+                  <a:txBody>
+                    <a:bodyPr/>
+                    <a:lstStyle/>
+                    <a:p>
+                      <a:r>
+                        <a:rPr lang="en-US" dirty="0"/>
+                        <a:t>MSE</a:t>
+                      </a:r>
+                    </a:p>
+                  </a:txBody>
+                  <a:tcPr/>
+                </a:tc>
+                <a:extLst>
+                  <a:ext uri="{0D108BD9-81ED-4DB2-BD59-A6C34878D82A}">
+                    <a16:rowId xmlns:a16="http://schemas.microsoft.com/office/drawing/2014/main" val="2061388709"/>
+                  </a:ext>
+                </a:extLst>
+              </a:tr>
+              <a:tr h="735496">
+                <a:tc>
+                  <a:txBody>
+                    <a:bodyPr/>
+                    <a:lstStyle/>
+                    <a:p>
+                      <a:pPr algn="ctr"/>
+                      <a:r>
+                        <a:rPr lang="en-US" dirty="0"/>
+                        <a:t>Single Feature OLS</a:t>
+                      </a:r>
+                    </a:p>
+                  </a:txBody>
+                  <a:tcPr/>
+                </a:tc>
+                <a:tc>
+                  <a:txBody>
+                    <a:bodyPr/>
+                    <a:lstStyle/>
+                    <a:p>
+                      <a:pPr algn="ctr"/>
+                      <a:r>
+                        <a:rPr lang="en-US" dirty="0"/>
+                        <a:t>0.618</a:t>
+                      </a:r>
+                    </a:p>
+                  </a:txBody>
+                  <a:tcPr/>
+                </a:tc>
+                <a:tc>
+                  <a:txBody>
+                    <a:bodyPr/>
+                    <a:lstStyle/>
+                    <a:p>
+                      <a:pPr algn="ctr"/>
+                      <a:r>
+                        <a:rPr lang="en-US" dirty="0"/>
+                        <a:t>0.686</a:t>
+                      </a:r>
+                    </a:p>
+                  </a:txBody>
+                  <a:tcPr/>
+                </a:tc>
+                <a:tc>
+                  <a:txBody>
+                    <a:bodyPr/>
+                    <a:lstStyle/>
+                    <a:p>
+                      <a:pPr algn="ctr"/>
+                      <a:r>
+                        <a:rPr lang="en-US" dirty="0"/>
+                        <a:t>1814796444.73</a:t>
+                      </a:r>
+                    </a:p>
+                  </a:txBody>
+                  <a:tcPr/>
+                </a:tc>
+                <a:extLst>
+                  <a:ext uri="{0D108BD9-81ED-4DB2-BD59-A6C34878D82A}">
+                    <a16:rowId xmlns:a16="http://schemas.microsoft.com/office/drawing/2014/main" val="1031353369"/>
+                  </a:ext>
+                </a:extLst>
+              </a:tr>
+            </a:tbl>
+          </a:graphicData>
+        </a:graphic>
+      </p:graphicFrame>
+    </p:spTree>
+    <p:extLst>
+      <p:ext uri="{BB962C8B-B14F-4D97-AF65-F5344CB8AC3E}">
+        <p14:creationId xmlns:p14="http://schemas.microsoft.com/office/powerpoint/2010/main" val="1822752777"/>
+      </p:ext>
+    </p:extLst>
+  </p:cSld>
+  <p:clrMapOvr>
+    <a:masterClrMapping/>
+  </p:clrMapOvr>
+</p:sld>
+</file>
+
+<file path=ppt/slides/slide6.xml><?xml version="1.0" encoding="utf-8"?>
+<p:sld xmlns:a="http://schemas.openxmlformats.org/drawingml/2006/main" xmlns:r="http://schemas.openxmlformats.org/officeDocument/2006/relationships" xmlns:p="http://schemas.openxmlformats.org/presentationml/2006/main">
+  <p:cSld>
+    <p:spTree>
+      <p:nvGrpSpPr>
+        <p:cNvPr id="1" name=""/>
+        <p:cNvGrpSpPr/>
+        <p:nvPr/>
+      </p:nvGrpSpPr>
+      <p:grpSpPr>
+        <a:xfrm>
+          <a:off x="0" y="0"/>
+          <a:ext cx="0" cy="0"/>
+          <a:chOff x="0" y="0"/>
+          <a:chExt cx="0" cy="0"/>
+        </a:xfrm>
+      </p:grpSpPr>
+      <p:sp>
+        <p:nvSpPr>
+          <p:cNvPr id="4" name="Rectangle 3">
+            <a:extLst>
+              <a:ext uri="{FF2B5EF4-FFF2-40B4-BE49-F238E27FC236}">
+                <a16:creationId xmlns:a16="http://schemas.microsoft.com/office/drawing/2014/main" id="{336DBEF0-7328-48E9-BF82-299017D4364D}"/>
+              </a:ext>
+            </a:extLst>
+          </p:cNvPr>
+          <p:cNvSpPr/>
+          <p:nvPr/>
+        </p:nvSpPr>
+        <p:spPr>
+          <a:xfrm>
+            <a:off x="0" y="0"/>
+            <a:ext cx="12192000" cy="1116353"/>
+          </a:xfrm>
+          <a:prstGeom prst="rect">
+            <a:avLst/>
+          </a:prstGeom>
+        </p:spPr>
+        <p:style>
+          <a:lnRef idx="2">
+            <a:schemeClr val="accent1">
+              <a:shade val="50000"/>
+            </a:schemeClr>
+          </a:lnRef>
+          <a:fillRef idx="1">
+            <a:schemeClr val="accent1"/>
+          </a:fillRef>
+          <a:effectRef idx="0">
+            <a:schemeClr val="accent1"/>
+          </a:effectRef>
+          <a:fontRef idx="minor">
+            <a:schemeClr val="lt1"/>
+          </a:fontRef>
+        </p:style>
+        <p:txBody>
+          <a:bodyPr rtlCol="0" anchor="ctr"/>
+          <a:lstStyle/>
+          <a:p>
+            <a:pPr algn="ctr"/>
+            <a:endParaRPr lang="en-US"/>
           </a:p>
         </p:txBody>
       </p:sp>
       <p:sp>
         <p:nvSpPr>
-          <p:cNvPr id="6" name="Content Placeholder 5">
+          <p:cNvPr id="2" name="Title 1">
             <a:extLst>
               <a:ext uri="{FF2B5EF4-FFF2-40B4-BE49-F238E27FC236}">
-                <a16:creationId xmlns:a16="http://schemas.microsoft.com/office/drawing/2014/main" id="{26F718AD-E933-43C0-BD2B-135BF343B637}"/>
+                <a16:creationId xmlns:a16="http://schemas.microsoft.com/office/drawing/2014/main" id="{F62E801A-2DC1-4FCF-8A19-E998D2D44A30}"/>
               </a:ext>
             </a:extLst>
           </p:cNvPr>
@@ -13880,58 +15502,202 @@
             <a:spLocks noGrp="1"/>
           </p:cNvSpPr>
           <p:nvPr>
-            <p:ph idx="1"/>
+            <p:ph type="title"/>
           </p:nvPr>
         </p:nvSpPr>
         <p:spPr>
           <a:xfrm>
-            <a:off x="391378" y="2145384"/>
-            <a:ext cx="10515600" cy="4351338"/>
+            <a:off x="305266" y="18255"/>
+            <a:ext cx="11710960" cy="1325563"/>
           </a:xfrm>
         </p:spPr>
         <p:txBody>
-          <a:bodyPr/>
+          <a:bodyPr>
+            <a:normAutofit/>
+          </a:bodyPr>
           <a:lstStyle/>
           <a:p>
+            <a:r>
+              <a:rPr lang="en-US" dirty="0">
+                <a:solidFill>
+                  <a:schemeClr val="bg1"/>
+                </a:solidFill>
+              </a:rPr>
+              <a:t>Ordinary Least Squares Multiple Regression</a:t>
+            </a:r>
+          </a:p>
+        </p:txBody>
+      </p:sp>
+      <p:sp>
+        <p:nvSpPr>
+          <p:cNvPr id="8" name="TextBox 7">
+            <a:extLst>
+              <a:ext uri="{FF2B5EF4-FFF2-40B4-BE49-F238E27FC236}">
+                <a16:creationId xmlns:a16="http://schemas.microsoft.com/office/drawing/2014/main" id="{63BE62FE-4449-4620-8637-C3A25776BEB7}"/>
+              </a:ext>
+            </a:extLst>
+          </p:cNvPr>
+          <p:cNvSpPr txBox="1"/>
+          <p:nvPr/>
+        </p:nvSpPr>
+        <p:spPr>
+          <a:xfrm>
+            <a:off x="723666" y="2017657"/>
+            <a:ext cx="4543951" cy="3693319"/>
+          </a:xfrm>
+          <a:prstGeom prst="rect">
+            <a:avLst/>
+          </a:prstGeom>
+          <a:noFill/>
+        </p:spPr>
+        <p:txBody>
+          <a:bodyPr wrap="square" rtlCol="0">
+            <a:spAutoFit/>
+          </a:bodyPr>
+          <a:lstStyle/>
+          <a:p>
+            <a:pPr marL="285750" indent="-285750">
+              <a:buFont typeface="Arial" panose="020B0604020202020204" pitchFamily="34" charset="0"/>
+              <a:buChar char="•"/>
+            </a:pPr>
             <a:r>
               <a:rPr lang="en-US" dirty="0"/>
-              <a:t>Kaggle </a:t>
+              <a:t>Normalized the price feature with the natural log (originally skewed right)</a:t>
             </a:r>
-            <a:r>
-              <a:rPr lang="en-US" dirty="0" err="1"/>
-              <a:t>DataSet</a:t>
-            </a:r>
+          </a:p>
+          <a:p>
+            <a:endParaRPr lang="en-US" dirty="0"/>
+          </a:p>
+          <a:p>
+            <a:pPr marL="285750" indent="-285750">
+              <a:buFont typeface="Arial" panose="020B0604020202020204" pitchFamily="34" charset="0"/>
+              <a:buChar char="•"/>
+            </a:pPr>
             <a:r>
               <a:rPr lang="en-US" dirty="0"/>
-              <a:t>(</a:t>
+              <a:t>Eliminated all categorical data and initially focused on numeric</a:t>
             </a:r>
-            <a:r>
-              <a:rPr lang="en-US" dirty="0">
-                <a:hlinkClick r:id="rId2"/>
-              </a:rPr>
-              <a:t>https://www.kaggle.com/c/house-prices-advanced-regression-techniques/data</a:t>
-            </a:r>
+          </a:p>
+          <a:p>
+            <a:pPr marL="742950" lvl="1" indent="-285750">
+              <a:buFont typeface="Arial" panose="020B0604020202020204" pitchFamily="34" charset="0"/>
+              <a:buChar char="•"/>
+            </a:pPr>
             <a:r>
               <a:rPr lang="en-US" dirty="0"/>
-              <a:t>) </a:t>
+              <a:t>Median() </a:t>
             </a:r>
           </a:p>
           <a:p>
+            <a:pPr marL="742950" lvl="1" indent="-285750">
+              <a:buFont typeface="Arial" panose="020B0604020202020204" pitchFamily="34" charset="0"/>
+              <a:buChar char="•"/>
+            </a:pPr>
             <a:r>
               <a:rPr lang="en-US" dirty="0"/>
-              <a:t>1,460 homes in Ames, Iowa</a:t>
+              <a:t>Mean()</a:t>
             </a:r>
           </a:p>
           <a:p>
+            <a:pPr marL="285750" indent="-285750">
+              <a:buFont typeface="Arial" panose="020B0604020202020204" pitchFamily="34" charset="0"/>
+              <a:buChar char="•"/>
+            </a:pPr>
+            <a:endParaRPr lang="en-US" dirty="0"/>
+          </a:p>
+          <a:p>
+            <a:pPr marL="285750" indent="-285750">
+              <a:buFont typeface="Arial" panose="020B0604020202020204" pitchFamily="34" charset="0"/>
+              <a:buChar char="•"/>
+            </a:pPr>
             <a:r>
               <a:rPr lang="en-US" dirty="0"/>
-              <a:t>79 explanatory variables for almost every home</a:t>
+              <a:t>Testing score was in the mid 80’s</a:t>
             </a:r>
           </a:p>
           <a:p>
+            <a:pPr marL="285750" indent="-285750">
+              <a:buFont typeface="Arial" panose="020B0604020202020204" pitchFamily="34" charset="0"/>
+              <a:buChar char="•"/>
+            </a:pPr>
+            <a:endParaRPr lang="en-US" dirty="0"/>
+          </a:p>
+          <a:p>
+            <a:pPr marL="285750" indent="-285750">
+              <a:buFont typeface="Arial" panose="020B0604020202020204" pitchFamily="34" charset="0"/>
+              <a:buChar char="•"/>
+            </a:pPr>
             <a:r>
               <a:rPr lang="en-US" dirty="0"/>
-              <a:t>Categorical and numerical data features</a:t>
+              <a:t>Used seaborn correlation heat map to eliminate clear, uncorrelated features</a:t>
+            </a:r>
+          </a:p>
+          <a:p>
+            <a:endParaRPr lang="en-US" dirty="0"/>
+          </a:p>
+        </p:txBody>
+      </p:sp>
+      <p:pic>
+        <p:nvPicPr>
+          <p:cNvPr id="11" name="Picture 10">
+            <a:extLst>
+              <a:ext uri="{FF2B5EF4-FFF2-40B4-BE49-F238E27FC236}">
+                <a16:creationId xmlns:a16="http://schemas.microsoft.com/office/drawing/2014/main" id="{C823D7D2-C395-44CF-BDDE-C1653BA08169}"/>
+              </a:ext>
+            </a:extLst>
+          </p:cNvPr>
+          <p:cNvPicPr>
+            <a:picLocks noChangeAspect="1"/>
+          </p:cNvPicPr>
+          <p:nvPr/>
+        </p:nvPicPr>
+        <p:blipFill>
+          <a:blip r:embed="rId2"/>
+          <a:stretch>
+            <a:fillRect/>
+          </a:stretch>
+        </p:blipFill>
+        <p:spPr>
+          <a:xfrm>
+            <a:off x="5561423" y="1335928"/>
+            <a:ext cx="6542690" cy="5503817"/>
+          </a:xfrm>
+          <a:prstGeom prst="rect">
+            <a:avLst/>
+          </a:prstGeom>
+        </p:spPr>
+      </p:pic>
+      <p:sp>
+        <p:nvSpPr>
+          <p:cNvPr id="12" name="TextBox 11">
+            <a:extLst>
+              <a:ext uri="{FF2B5EF4-FFF2-40B4-BE49-F238E27FC236}">
+                <a16:creationId xmlns:a16="http://schemas.microsoft.com/office/drawing/2014/main" id="{945F3729-116A-4D02-965A-6C0C70E92E96}"/>
+              </a:ext>
+            </a:extLst>
+          </p:cNvPr>
+          <p:cNvSpPr txBox="1"/>
+          <p:nvPr/>
+        </p:nvSpPr>
+        <p:spPr>
+          <a:xfrm>
+            <a:off x="305266" y="1258824"/>
+            <a:ext cx="4693080" cy="523220"/>
+          </a:xfrm>
+          <a:prstGeom prst="rect">
+            <a:avLst/>
+          </a:prstGeom>
+          <a:noFill/>
+        </p:spPr>
+        <p:txBody>
+          <a:bodyPr wrap="square" rtlCol="0">
+            <a:spAutoFit/>
+          </a:bodyPr>
+          <a:lstStyle/>
+          <a:p>
+            <a:r>
+              <a:rPr lang="en-US" sz="1400" b="1" dirty="0"/>
+              <a:t>Goal: Minimize the sum of square differences between observed and predicted values</a:t>
             </a:r>
           </a:p>
         </p:txBody>
@@ -13939,7 +15705,7 @@
     </p:spTree>
     <p:extLst>
       <p:ext uri="{BB962C8B-B14F-4D97-AF65-F5344CB8AC3E}">
-        <p14:creationId xmlns:p14="http://schemas.microsoft.com/office/powerpoint/2010/main" val="1721869438"/>
+        <p14:creationId xmlns:p14="http://schemas.microsoft.com/office/powerpoint/2010/main" val="1322738186"/>
       </p:ext>
     </p:extLst>
   </p:cSld>
@@ -14053,10 +15819,10 @@
       </p:sp>
       <p:pic>
         <p:nvPicPr>
-          <p:cNvPr id="6" name="Picture 5">
+          <p:cNvPr id="3" name="Picture 2">
             <a:extLst>
               <a:ext uri="{FF2B5EF4-FFF2-40B4-BE49-F238E27FC236}">
-                <a16:creationId xmlns:a16="http://schemas.microsoft.com/office/drawing/2014/main" id="{D3A96ACD-8D92-4E25-95C6-61144FF49DC3}"/>
+                <a16:creationId xmlns:a16="http://schemas.microsoft.com/office/drawing/2014/main" id="{DDF68E30-9C76-4DED-8F91-7CCFDD2BDCC1}"/>
               </a:ext>
             </a:extLst>
           </p:cNvPr>
@@ -14073,38 +15839,8 @@
         </p:blipFill>
         <p:spPr>
           <a:xfrm>
-            <a:off x="129026" y="1607651"/>
-            <a:ext cx="5223644" cy="4776932"/>
-          </a:xfrm>
-          <a:prstGeom prst="rect">
-            <a:avLst/>
-          </a:prstGeom>
-        </p:spPr>
-      </p:pic>
-      <p:pic>
-        <p:nvPicPr>
-          <p:cNvPr id="8" name="Picture 7">
-            <a:extLst>
-              <a:ext uri="{FF2B5EF4-FFF2-40B4-BE49-F238E27FC236}">
-                <a16:creationId xmlns:a16="http://schemas.microsoft.com/office/drawing/2014/main" id="{3C35FEE8-163F-493D-8671-9AB360ED2544}"/>
-              </a:ext>
-            </a:extLst>
-          </p:cNvPr>
-          <p:cNvPicPr>
-            <a:picLocks noChangeAspect="1"/>
-          </p:cNvPicPr>
-          <p:nvPr/>
-        </p:nvPicPr>
-        <p:blipFill>
-          <a:blip r:embed="rId3"/>
-          <a:stretch>
-            <a:fillRect/>
-          </a:stretch>
-        </p:blipFill>
-        <p:spPr>
-          <a:xfrm>
-            <a:off x="8635230" y="2909975"/>
-            <a:ext cx="1743075" cy="2609850"/>
+            <a:off x="6686842" y="1788158"/>
+            <a:ext cx="4723785" cy="3967514"/>
           </a:xfrm>
           <a:prstGeom prst="rect">
             <a:avLst/>
@@ -14113,54 +15849,93 @@
       </p:pic>
       <p:sp>
         <p:nvSpPr>
-          <p:cNvPr id="9" name="Title 1">
+          <p:cNvPr id="8" name="TextBox 7">
             <a:extLst>
               <a:ext uri="{FF2B5EF4-FFF2-40B4-BE49-F238E27FC236}">
-                <a16:creationId xmlns:a16="http://schemas.microsoft.com/office/drawing/2014/main" id="{CCCFA817-377B-456A-8190-6C7AEDBC176E}"/>
+                <a16:creationId xmlns:a16="http://schemas.microsoft.com/office/drawing/2014/main" id="{1CE18622-C91C-434C-8835-AD19B8CA3CF1}"/>
               </a:ext>
             </a:extLst>
           </p:cNvPr>
-          <p:cNvSpPr txBox="1">
-            <a:spLocks/>
-          </p:cNvSpPr>
+          <p:cNvSpPr txBox="1"/>
           <p:nvPr/>
         </p:nvSpPr>
         <p:spPr>
           <a:xfrm>
-            <a:off x="8844108" y="1775741"/>
-            <a:ext cx="1325318" cy="998109"/>
+            <a:off x="678788" y="1576358"/>
+            <a:ext cx="4005408" cy="4247317"/>
           </a:xfrm>
           <a:prstGeom prst="rect">
             <a:avLst/>
           </a:prstGeom>
+          <a:noFill/>
         </p:spPr>
         <p:txBody>
-          <a:bodyPr vert="horz" lIns="91440" tIns="45720" rIns="91440" bIns="45720" rtlCol="0" anchor="ctr">
-            <a:normAutofit/>
+          <a:bodyPr wrap="square" rtlCol="0">
+            <a:spAutoFit/>
           </a:bodyPr>
-          <a:lstStyle>
-            <a:lvl1pPr algn="l" defTabSz="914400" rtl="0" eaLnBrk="1" latinLnBrk="0" hangingPunct="1">
-              <a:lnSpc>
-                <a:spcPct val="90000"/>
-              </a:lnSpc>
-              <a:spcBef>
-                <a:spcPct val="0"/>
-              </a:spcBef>
-              <a:buNone/>
-              <a:defRPr sz="4400" kern="1200">
-                <a:solidFill>
-                  <a:schemeClr val="tx1"/>
-                </a:solidFill>
-                <a:latin typeface="+mj-lt"/>
-                <a:ea typeface="+mj-ea"/>
-                <a:cs typeface="+mj-cs"/>
-              </a:defRPr>
-            </a:lvl1pPr>
-          </a:lstStyle>
-          <a:p>
+          <a:lstStyle/>
+          <a:p>
+            <a:pPr marL="285750" indent="-285750">
+              <a:buFont typeface="Arial" panose="020B0604020202020204" pitchFamily="34" charset="0"/>
+              <a:buChar char="•"/>
+            </a:pPr>
             <a:r>
-              <a:rPr lang="en-US" sz="2000" dirty="0"/>
-              <a:t>Null Values</a:t>
+              <a:rPr lang="en-US" dirty="0"/>
+              <a:t>Converted categorical data to numeric and included the highest correlated features in the model</a:t>
+            </a:r>
+          </a:p>
+          <a:p>
+            <a:pPr marL="285750" indent="-285750">
+              <a:buFont typeface="Arial" panose="020B0604020202020204" pitchFamily="34" charset="0"/>
+              <a:buChar char="•"/>
+            </a:pPr>
+            <a:endParaRPr lang="en-US" dirty="0"/>
+          </a:p>
+          <a:p>
+            <a:pPr marL="285750" indent="-285750">
+              <a:buFont typeface="Arial" panose="020B0604020202020204" pitchFamily="34" charset="0"/>
+              <a:buChar char="•"/>
+            </a:pPr>
+            <a:r>
+              <a:rPr lang="en-US" dirty="0"/>
+              <a:t>Resulted in 33 features and 91.3% testing accuracy</a:t>
+            </a:r>
+          </a:p>
+          <a:p>
+            <a:pPr marL="285750" indent="-285750">
+              <a:buFont typeface="Arial" panose="020B0604020202020204" pitchFamily="34" charset="0"/>
+              <a:buChar char="•"/>
+            </a:pPr>
+            <a:endParaRPr lang="en-US" dirty="0"/>
+          </a:p>
+          <a:p>
+            <a:pPr marL="285750" indent="-285750">
+              <a:buFont typeface="Arial" panose="020B0604020202020204" pitchFamily="34" charset="0"/>
+              <a:buChar char="•"/>
+            </a:pPr>
+            <a:r>
+              <a:rPr lang="en-US" dirty="0"/>
+              <a:t>Utilized recursive feature elimination to find the optimal number of features</a:t>
+            </a:r>
+          </a:p>
+          <a:p>
+            <a:pPr marL="742950" lvl="1" indent="-285750">
+              <a:buFont typeface="Courier New" panose="02070309020205020404" pitchFamily="49" charset="0"/>
+              <a:buChar char="o"/>
+            </a:pPr>
+            <a:r>
+              <a:rPr lang="en-US" dirty="0"/>
+              <a:t>Resulted in 13 features</a:t>
+            </a:r>
+          </a:p>
+          <a:p>
+            <a:pPr marL="742950" lvl="1" indent="-285750">
+              <a:buFont typeface="Courier New" panose="02070309020205020404" pitchFamily="49" charset="0"/>
+              <a:buChar char="o"/>
+            </a:pPr>
+            <a:r>
+              <a:rPr lang="en-US" dirty="0"/>
+              <a:t>However, when those features were used and tested, the accuracy of the testing model dropped</a:t>
             </a:r>
           </a:p>
         </p:txBody>
@@ -14168,7 +15943,7 @@
     </p:spTree>
     <p:extLst>
       <p:ext uri="{BB962C8B-B14F-4D97-AF65-F5344CB8AC3E}">
-        <p14:creationId xmlns:p14="http://schemas.microsoft.com/office/powerpoint/2010/main" val="2268026075"/>
+        <p14:creationId xmlns:p14="http://schemas.microsoft.com/office/powerpoint/2010/main" val="828494711"/>
       </p:ext>
     </p:extLst>
   </p:cSld>
@@ -14209,7 +15984,7 @@
         </p:nvSpPr>
         <p:spPr>
           <a:xfrm>
-            <a:off x="0" y="0"/>
+            <a:off x="-44879" y="0"/>
             <a:ext cx="12192000" cy="1116353"/>
           </a:xfrm>
           <a:prstGeom prst="rect">
@@ -14275,7 +16050,7 @@
                   <a:schemeClr val="bg1"/>
                 </a:solidFill>
               </a:rPr>
-              <a:t>Exploring The Data</a:t>
+              <a:t>Nate-Lasso Regression</a:t>
             </a:r>
           </a:p>
         </p:txBody>
@@ -14285,7 +16060,7 @@
           <p:cNvPr id="5" name="Picture 4">
             <a:extLst>
               <a:ext uri="{FF2B5EF4-FFF2-40B4-BE49-F238E27FC236}">
-                <a16:creationId xmlns:a16="http://schemas.microsoft.com/office/drawing/2014/main" id="{BD03B7CE-842C-4EA5-8C8E-C1919ABD4DB3}"/>
+                <a16:creationId xmlns:a16="http://schemas.microsoft.com/office/drawing/2014/main" id="{716A27D0-5666-4143-837D-57F7A8D79601}"/>
               </a:ext>
             </a:extLst>
           </p:cNvPr>
@@ -14302,8 +16077,194 @@
         </p:blipFill>
         <p:spPr>
           <a:xfrm>
-            <a:off x="2417831" y="1362073"/>
-            <a:ext cx="6542690" cy="5503817"/>
+            <a:off x="6679502" y="2390775"/>
+            <a:ext cx="5286644" cy="3524429"/>
+          </a:xfrm>
+          <a:prstGeom prst="rect">
+            <a:avLst/>
+          </a:prstGeom>
+        </p:spPr>
+      </p:pic>
+      <p:sp>
+        <p:nvSpPr>
+          <p:cNvPr id="7" name="TextBox 6">
+            <a:extLst>
+              <a:ext uri="{FF2B5EF4-FFF2-40B4-BE49-F238E27FC236}">
+                <a16:creationId xmlns:a16="http://schemas.microsoft.com/office/drawing/2014/main" id="{EADC0A94-CA0D-4E6B-A2C3-51554259F6DA}"/>
+              </a:ext>
+            </a:extLst>
+          </p:cNvPr>
+          <p:cNvSpPr txBox="1"/>
+          <p:nvPr/>
+        </p:nvSpPr>
+        <p:spPr>
+          <a:xfrm>
+            <a:off x="6679502" y="1304923"/>
+            <a:ext cx="5286644" cy="1200329"/>
+          </a:xfrm>
+          <a:prstGeom prst="rect">
+            <a:avLst/>
+          </a:prstGeom>
+          <a:noFill/>
+        </p:spPr>
+        <p:txBody>
+          <a:bodyPr wrap="square" rtlCol="0">
+            <a:spAutoFit/>
+          </a:bodyPr>
+          <a:lstStyle/>
+          <a:p>
+            <a:pPr marL="285750" indent="-285750">
+              <a:buFont typeface="Arial" panose="020B0604020202020204" pitchFamily="34" charset="0"/>
+              <a:buChar char="•"/>
+            </a:pPr>
+            <a:r>
+              <a:rPr lang="en-US" dirty="0"/>
+              <a:t>After cleaning data, I looked to make sure the data followed a normal distribution. It was not. </a:t>
+            </a:r>
+          </a:p>
+          <a:p>
+            <a:pPr marL="742950" lvl="1" indent="-285750">
+              <a:buFont typeface="Arial" panose="020B0604020202020204" pitchFamily="34" charset="0"/>
+              <a:buChar char="•"/>
+            </a:pPr>
+            <a:r>
+              <a:rPr lang="en-US" dirty="0"/>
+              <a:t>I used a box-cox to transform the data to a normal distribution.</a:t>
+            </a:r>
+          </a:p>
+        </p:txBody>
+      </p:sp>
+      <p:pic>
+        <p:nvPicPr>
+          <p:cNvPr id="9" name="Picture 8">
+            <a:extLst>
+              <a:ext uri="{FF2B5EF4-FFF2-40B4-BE49-F238E27FC236}">
+                <a16:creationId xmlns:a16="http://schemas.microsoft.com/office/drawing/2014/main" id="{524DD2B1-278C-4AFE-9C45-AC341F3256E1}"/>
+              </a:ext>
+            </a:extLst>
+          </p:cNvPr>
+          <p:cNvPicPr>
+            <a:picLocks noChangeAspect="1"/>
+          </p:cNvPicPr>
+          <p:nvPr/>
+        </p:nvPicPr>
+        <p:blipFill>
+          <a:blip r:embed="rId3"/>
+          <a:stretch>
+            <a:fillRect/>
+          </a:stretch>
+        </p:blipFill>
+        <p:spPr>
+          <a:xfrm>
+            <a:off x="581626" y="2390775"/>
+            <a:ext cx="4733925" cy="4010025"/>
+          </a:xfrm>
+          <a:prstGeom prst="rect">
+            <a:avLst/>
+          </a:prstGeom>
+        </p:spPr>
+      </p:pic>
+      <p:sp>
+        <p:nvSpPr>
+          <p:cNvPr id="11" name="TextBox 10">
+            <a:extLst>
+              <a:ext uri="{FF2B5EF4-FFF2-40B4-BE49-F238E27FC236}">
+                <a16:creationId xmlns:a16="http://schemas.microsoft.com/office/drawing/2014/main" id="{78E2B9A4-8289-4B6D-8180-7EB896E369D4}"/>
+              </a:ext>
+            </a:extLst>
+          </p:cNvPr>
+          <p:cNvSpPr txBox="1"/>
+          <p:nvPr/>
+        </p:nvSpPr>
+        <p:spPr>
+          <a:xfrm>
+            <a:off x="305267" y="1304923"/>
+            <a:ext cx="5286644" cy="923330"/>
+          </a:xfrm>
+          <a:prstGeom prst="rect">
+            <a:avLst/>
+          </a:prstGeom>
+          <a:noFill/>
+        </p:spPr>
+        <p:txBody>
+          <a:bodyPr wrap="square" rtlCol="0">
+            <a:spAutoFit/>
+          </a:bodyPr>
+          <a:lstStyle/>
+          <a:p>
+            <a:pPr marL="285750" indent="-285750">
+              <a:buFont typeface="Arial" panose="020B0604020202020204" pitchFamily="34" charset="0"/>
+              <a:buChar char="•"/>
+            </a:pPr>
+            <a:r>
+              <a:rPr lang="en-US" dirty="0"/>
+              <a:t>I first wanted to review all the numerical features and their correlation to </a:t>
+            </a:r>
+            <a:r>
+              <a:rPr lang="en-US" dirty="0" err="1"/>
+              <a:t>SalePrice</a:t>
+            </a:r>
+            <a:r>
+              <a:rPr lang="en-US" dirty="0"/>
+              <a:t>. This provided me with the features that I will use for the train set.</a:t>
+            </a:r>
+          </a:p>
+        </p:txBody>
+      </p:sp>
+      <p:pic>
+        <p:nvPicPr>
+          <p:cNvPr id="12" name="Picture 11">
+            <a:extLst>
+              <a:ext uri="{FF2B5EF4-FFF2-40B4-BE49-F238E27FC236}">
+                <a16:creationId xmlns:a16="http://schemas.microsoft.com/office/drawing/2014/main" id="{A4658C93-B1F2-41A9-B3DE-0D47602F22B7}"/>
+              </a:ext>
+            </a:extLst>
+          </p:cNvPr>
+          <p:cNvPicPr>
+            <a:picLocks noChangeAspect="1"/>
+          </p:cNvPicPr>
+          <p:nvPr/>
+        </p:nvPicPr>
+        <p:blipFill>
+          <a:blip r:embed="rId4"/>
+          <a:stretch>
+            <a:fillRect/>
+          </a:stretch>
+        </p:blipFill>
+        <p:spPr>
+          <a:xfrm>
+            <a:off x="225854" y="6538123"/>
+            <a:ext cx="5870146" cy="185295"/>
+          </a:xfrm>
+          <a:prstGeom prst="rect">
+            <a:avLst/>
+          </a:prstGeom>
+        </p:spPr>
+      </p:pic>
+      <p:pic>
+        <p:nvPicPr>
+          <p:cNvPr id="13" name="Picture 12">
+            <a:extLst>
+              <a:ext uri="{FF2B5EF4-FFF2-40B4-BE49-F238E27FC236}">
+                <a16:creationId xmlns:a16="http://schemas.microsoft.com/office/drawing/2014/main" id="{B274D45D-752F-4D07-9797-3DDA2D19475B}"/>
+              </a:ext>
+            </a:extLst>
+          </p:cNvPr>
+          <p:cNvPicPr>
+            <a:picLocks noChangeAspect="1"/>
+          </p:cNvPicPr>
+          <p:nvPr/>
+        </p:nvPicPr>
+        <p:blipFill>
+          <a:blip r:embed="rId5"/>
+          <a:stretch>
+            <a:fillRect/>
+          </a:stretch>
+        </p:blipFill>
+        <p:spPr>
+          <a:xfrm>
+            <a:off x="6846459" y="6052527"/>
+            <a:ext cx="5119687" cy="177719"/>
           </a:xfrm>
           <a:prstGeom prst="rect">
             <a:avLst/>
@@ -14313,7 +16274,7 @@
     </p:spTree>
     <p:extLst>
       <p:ext uri="{BB962C8B-B14F-4D97-AF65-F5344CB8AC3E}">
-        <p14:creationId xmlns:p14="http://schemas.microsoft.com/office/powerpoint/2010/main" val="828494711"/>
+        <p14:creationId xmlns:p14="http://schemas.microsoft.com/office/powerpoint/2010/main" val="4153007495"/>
       </p:ext>
     </p:extLst>
   </p:cSld>
@@ -14354,7 +16315,7 @@
         </p:nvSpPr>
         <p:spPr>
           <a:xfrm>
-            <a:off x="0" y="0"/>
+            <a:off x="-44879" y="0"/>
             <a:ext cx="12192000" cy="1116353"/>
           </a:xfrm>
           <a:prstGeom prst="rect">
@@ -14420,17 +16381,155 @@
                   <a:schemeClr val="bg1"/>
                 </a:solidFill>
               </a:rPr>
-              <a:t>Standard Linear Regression</a:t>
+              <a:t>Lasso Regression</a:t>
             </a:r>
+          </a:p>
+        </p:txBody>
+      </p:sp>
+      <p:sp>
+        <p:nvSpPr>
+          <p:cNvPr id="7" name="TextBox 6">
+            <a:extLst>
+              <a:ext uri="{FF2B5EF4-FFF2-40B4-BE49-F238E27FC236}">
+                <a16:creationId xmlns:a16="http://schemas.microsoft.com/office/drawing/2014/main" id="{EADC0A94-CA0D-4E6B-A2C3-51554259F6DA}"/>
+              </a:ext>
+            </a:extLst>
+          </p:cNvPr>
+          <p:cNvSpPr txBox="1"/>
+          <p:nvPr/>
+        </p:nvSpPr>
+        <p:spPr>
+          <a:xfrm>
+            <a:off x="6679502" y="1304923"/>
+            <a:ext cx="5286644" cy="923330"/>
+          </a:xfrm>
+          <a:prstGeom prst="rect">
+            <a:avLst/>
+          </a:prstGeom>
+          <a:noFill/>
+        </p:spPr>
+        <p:txBody>
+          <a:bodyPr wrap="square" rtlCol="0">
+            <a:spAutoFit/>
+          </a:bodyPr>
+          <a:lstStyle/>
+          <a:p>
+            <a:pPr marL="285750" indent="-285750">
+              <a:buFont typeface="Arial" panose="020B0604020202020204" pitchFamily="34" charset="0"/>
+              <a:buChar char="•"/>
+            </a:pPr>
+            <a:r>
+              <a:rPr lang="en-US" dirty="0"/>
+              <a:t>Based on the density of the residual plot, we can see high levels of accuracy however we are able to identify some outliers in the training set. </a:t>
+            </a:r>
+          </a:p>
+        </p:txBody>
+      </p:sp>
+      <p:sp>
+        <p:nvSpPr>
+          <p:cNvPr id="11" name="TextBox 10">
+            <a:extLst>
+              <a:ext uri="{FF2B5EF4-FFF2-40B4-BE49-F238E27FC236}">
+                <a16:creationId xmlns:a16="http://schemas.microsoft.com/office/drawing/2014/main" id="{78E2B9A4-8289-4B6D-8180-7EB896E369D4}"/>
+              </a:ext>
+            </a:extLst>
+          </p:cNvPr>
+          <p:cNvSpPr txBox="1"/>
+          <p:nvPr/>
+        </p:nvSpPr>
+        <p:spPr>
+          <a:xfrm>
+            <a:off x="305266" y="1304923"/>
+            <a:ext cx="5505315" cy="2585323"/>
+          </a:xfrm>
+          <a:prstGeom prst="rect">
+            <a:avLst/>
+          </a:prstGeom>
+          <a:noFill/>
+        </p:spPr>
+        <p:txBody>
+          <a:bodyPr wrap="square" rtlCol="0">
+            <a:spAutoFit/>
+          </a:bodyPr>
+          <a:lstStyle/>
+          <a:p>
+            <a:pPr marL="285750" indent="-285750">
+              <a:buFont typeface="Arial" panose="020B0604020202020204" pitchFamily="34" charset="0"/>
+              <a:buChar char="•"/>
+            </a:pPr>
+            <a:r>
+              <a:rPr lang="en-US" dirty="0"/>
+              <a:t>The data set was divided into a train and test set where </a:t>
+            </a:r>
+            <a:r>
+              <a:rPr lang="en-US" dirty="0" err="1"/>
+              <a:t>GridSearchCV</a:t>
+            </a:r>
+            <a:r>
+              <a:rPr lang="en-US" dirty="0"/>
+              <a:t> was used to get the best alpha and train and test the data with a Lasso Regression.</a:t>
+            </a:r>
+          </a:p>
+          <a:p>
+            <a:pPr marL="742950" lvl="1" indent="-285750">
+              <a:buFont typeface="Arial" panose="020B0604020202020204" pitchFamily="34" charset="0"/>
+              <a:buChar char="•"/>
+            </a:pPr>
+            <a:r>
+              <a:rPr lang="en-US" dirty="0"/>
+              <a:t>The best alpha was 0.001</a:t>
+            </a:r>
+          </a:p>
+          <a:p>
+            <a:pPr marL="742950" lvl="1" indent="-285750">
+              <a:buFont typeface="Arial" panose="020B0604020202020204" pitchFamily="34" charset="0"/>
+              <a:buChar char="•"/>
+            </a:pPr>
+            <a:r>
+              <a:rPr lang="en-US" dirty="0"/>
+              <a:t>Train set had 977 records and 15 features</a:t>
+            </a:r>
+          </a:p>
+          <a:p>
+            <a:pPr marL="742950" lvl="1" indent="-285750">
+              <a:buFont typeface="Arial" panose="020B0604020202020204" pitchFamily="34" charset="0"/>
+              <a:buChar char="•"/>
+            </a:pPr>
+            <a:r>
+              <a:rPr lang="en-US" dirty="0"/>
+              <a:t>Test set had 977 records to predict </a:t>
+            </a:r>
+            <a:r>
+              <a:rPr lang="en-US" dirty="0" err="1"/>
+              <a:t>SalePrice</a:t>
+            </a:r>
+            <a:endParaRPr lang="en-US" dirty="0"/>
+          </a:p>
+          <a:p>
+            <a:pPr marL="285750" indent="-285750">
+              <a:buFont typeface="Arial" panose="020B0604020202020204" pitchFamily="34" charset="0"/>
+              <a:buChar char="•"/>
+            </a:pPr>
+            <a:r>
+              <a:rPr lang="en-US" dirty="0"/>
+              <a:t>Compared to a standard linear regression it had slightly improved results, 0.05 and a lower MSE, 0.017</a:t>
+            </a:r>
+          </a:p>
+          <a:p>
+            <a:pPr marL="285750" indent="-285750">
+              <a:buFont typeface="Arial" panose="020B0604020202020204" pitchFamily="34" charset="0"/>
+              <a:buChar char="•"/>
+            </a:pPr>
+            <a:endParaRPr lang="en-US" dirty="0"/>
           </a:p>
         </p:txBody>
       </p:sp>
       <p:pic>
         <p:nvPicPr>
-          <p:cNvPr id="6" name="Picture 5">
+          <p:cNvPr id="3" name="Picture 2">
             <a:extLst>
               <a:ext uri="{FF2B5EF4-FFF2-40B4-BE49-F238E27FC236}">
-                <a16:creationId xmlns:a16="http://schemas.microsoft.com/office/drawing/2014/main" id="{E140D26F-BDC3-4BEA-8AB9-B0258C7D359F}"/>
+                <a16:creationId xmlns:a16="http://schemas.microsoft.com/office/drawing/2014/main" id="{5338D07D-585A-4BA8-9562-633A23558B71}"/>
               </a:ext>
             </a:extLst>
           </p:cNvPr>
@@ -14447,69 +16546,20 @@
         </p:blipFill>
         <p:spPr>
           <a:xfrm>
-            <a:off x="7384390" y="1290258"/>
-            <a:ext cx="4317084" cy="3607112"/>
+            <a:off x="305266" y="4078816"/>
+            <a:ext cx="6092976" cy="1665786"/>
           </a:xfrm>
           <a:prstGeom prst="rect">
             <a:avLst/>
           </a:prstGeom>
         </p:spPr>
       </p:pic>
-      <p:sp>
-        <p:nvSpPr>
-          <p:cNvPr id="8" name="TextBox 7">
+      <p:pic>
+        <p:nvPicPr>
+          <p:cNvPr id="6" name="Picture 5">
             <a:extLst>
               <a:ext uri="{FF2B5EF4-FFF2-40B4-BE49-F238E27FC236}">
-                <a16:creationId xmlns:a16="http://schemas.microsoft.com/office/drawing/2014/main" id="{63BE62FE-4449-4620-8637-C3A25776BEB7}"/>
-              </a:ext>
-            </a:extLst>
-          </p:cNvPr>
-          <p:cNvSpPr txBox="1"/>
-          <p:nvPr/>
-        </p:nvSpPr>
-        <p:spPr>
-          <a:xfrm>
-            <a:off x="802204" y="1722213"/>
-            <a:ext cx="4005408" cy="1200329"/>
-          </a:xfrm>
-          <a:prstGeom prst="rect">
-            <a:avLst/>
-          </a:prstGeom>
-          <a:noFill/>
-        </p:spPr>
-        <p:txBody>
-          <a:bodyPr wrap="square" rtlCol="0">
-            <a:spAutoFit/>
-          </a:bodyPr>
-          <a:lstStyle/>
-          <a:p>
-            <a:pPr marL="285750" indent="-285750">
-              <a:buFont typeface="Arial" panose="020B0604020202020204" pitchFamily="34" charset="0"/>
-              <a:buChar char="•"/>
-            </a:pPr>
-            <a:r>
-              <a:rPr lang="en-US" dirty="0"/>
-              <a:t>Able to get 92% accuracy out of the model</a:t>
-            </a:r>
-          </a:p>
-          <a:p>
-            <a:pPr marL="285750" indent="-285750">
-              <a:buFont typeface="Arial" panose="020B0604020202020204" pitchFamily="34" charset="0"/>
-              <a:buChar char="•"/>
-            </a:pPr>
-            <a:r>
-              <a:rPr lang="en-US" dirty="0"/>
-              <a:t>However this required a large number of features</a:t>
-            </a:r>
-          </a:p>
-        </p:txBody>
-      </p:sp>
-      <p:pic>
-        <p:nvPicPr>
-          <p:cNvPr id="10" name="Picture 9">
-            <a:extLst>
-              <a:ext uri="{FF2B5EF4-FFF2-40B4-BE49-F238E27FC236}">
-                <a16:creationId xmlns:a16="http://schemas.microsoft.com/office/drawing/2014/main" id="{A554C847-A449-4647-8387-BA312FF6FAB4}"/>
+                <a16:creationId xmlns:a16="http://schemas.microsoft.com/office/drawing/2014/main" id="{ABB90308-DF1F-40F3-85F0-46E31514A628}"/>
               </a:ext>
             </a:extLst>
           </p:cNvPr>
@@ -14526,8 +16576,8 @@
         </p:blipFill>
         <p:spPr>
           <a:xfrm>
-            <a:off x="1214366" y="3586045"/>
-            <a:ext cx="4924425" cy="3152775"/>
+            <a:off x="6679502" y="2457452"/>
+            <a:ext cx="5219463" cy="3695698"/>
           </a:xfrm>
           <a:prstGeom prst="rect">
             <a:avLst/>
@@ -14537,7 +16587,7 @@
     </p:spTree>
     <p:extLst>
       <p:ext uri="{BB962C8B-B14F-4D97-AF65-F5344CB8AC3E}">
-        <p14:creationId xmlns:p14="http://schemas.microsoft.com/office/powerpoint/2010/main" val="1322738186"/>
+        <p14:creationId xmlns:p14="http://schemas.microsoft.com/office/powerpoint/2010/main" val="251283786"/>
       </p:ext>
     </p:extLst>
   </p:cSld>

</xml_diff>